<commit_message>
Added and edited slide deck for presentation
</commit_message>
<xml_diff>
--- a/Rhoconnect-appforum.pptx
+++ b/Rhoconnect-appforum.pptx
@@ -5,10 +5,10 @@
     <p:sldMasterId id="2147493455" r:id="rId4"/>
   </p:sldMasterIdLst>
   <p:notesMasterIdLst>
-    <p:notesMasterId r:id="rId26"/>
+    <p:notesMasterId r:id="rId27"/>
   </p:notesMasterIdLst>
   <p:handoutMasterIdLst>
-    <p:handoutMasterId r:id="rId27"/>
+    <p:handoutMasterId r:id="rId28"/>
   </p:handoutMasterIdLst>
   <p:sldIdLst>
     <p:sldId id="256" r:id="rId5"/>
@@ -27,11 +27,12 @@
     <p:sldId id="289" r:id="rId18"/>
     <p:sldId id="290" r:id="rId19"/>
     <p:sldId id="291" r:id="rId20"/>
-    <p:sldId id="292" r:id="rId21"/>
-    <p:sldId id="286" r:id="rId22"/>
-    <p:sldId id="288" r:id="rId23"/>
+    <p:sldId id="298" r:id="rId21"/>
+    <p:sldId id="292" r:id="rId22"/>
+    <p:sldId id="286" r:id="rId23"/>
     <p:sldId id="287" r:id="rId24"/>
-    <p:sldId id="294" r:id="rId25"/>
+    <p:sldId id="297" r:id="rId25"/>
+    <p:sldId id="296" r:id="rId26"/>
   </p:sldIdLst>
   <p:sldSz cx="9144000" cy="5143500" type="screen16x9"/>
   <p:notesSz cx="6858000" cy="9144000"/>
@@ -216,7 +217,7 @@
             <a:fld id="{03226B35-E884-5E4D-87DA-A7EDD87DC00C}" type="datetimeFigureOut">
               <a:rPr lang="en-US" smtClean="0"/>
               <a:pPr/>
-              <a:t>9/2/14</a:t>
+              <a:t>09/2/14</a:t>
             </a:fld>
             <a:endParaRPr lang="en-US"/>
           </a:p>
@@ -383,7 +384,7 @@
             <a:fld id="{6D788B50-DD5C-5F41-9B32-973BBF99E849}" type="datetimeFigureOut">
               <a:rPr lang="en-US" smtClean="0"/>
               <a:pPr/>
-              <a:t>9/2/14</a:t>
+              <a:t>09/2/14</a:t>
             </a:fld>
             <a:endParaRPr lang="en-US"/>
           </a:p>
@@ -734,6 +735,935 @@
 </p:notes>
 </file>
 
+<file path=ppt/notesSlides/notesSlide10.xml><?xml version="1.0" encoding="utf-8"?>
+<p:notes xmlns:a="http://schemas.openxmlformats.org/drawingml/2006/main" xmlns:r="http://schemas.openxmlformats.org/officeDocument/2006/relationships" xmlns:p="http://schemas.openxmlformats.org/presentationml/2006/main">
+  <p:cSld>
+    <p:spTree>
+      <p:nvGrpSpPr>
+        <p:cNvPr id="1" name=""/>
+        <p:cNvGrpSpPr/>
+        <p:nvPr/>
+      </p:nvGrpSpPr>
+      <p:grpSpPr>
+        <a:xfrm>
+          <a:off x="0" y="0"/>
+          <a:ext cx="0" cy="0"/>
+          <a:chOff x="0" y="0"/>
+          <a:chExt cx="0" cy="0"/>
+        </a:xfrm>
+      </p:grpSpPr>
+      <p:sp>
+        <p:nvSpPr>
+          <p:cNvPr id="2" name="Slide Image Placeholder 1"/>
+          <p:cNvSpPr>
+            <a:spLocks noGrp="1" noRot="1" noChangeAspect="1"/>
+          </p:cNvSpPr>
+          <p:nvPr>
+            <p:ph type="sldImg"/>
+          </p:nvPr>
+        </p:nvSpPr>
+        <p:spPr/>
+      </p:sp>
+      <p:sp>
+        <p:nvSpPr>
+          <p:cNvPr id="3" name="Notes Placeholder 2"/>
+          <p:cNvSpPr>
+            <a:spLocks noGrp="1"/>
+          </p:cNvSpPr>
+          <p:nvPr>
+            <p:ph type="body" idx="1"/>
+          </p:nvPr>
+        </p:nvSpPr>
+        <p:spPr/>
+        <p:txBody>
+          <a:bodyPr/>
+          <a:lstStyle/>
+          <a:p>
+            <a:r>
+              <a:rPr lang="en-US" dirty="0" smtClean="0"/>
+              <a:t>For this demo,</a:t>
+            </a:r>
+            <a:r>
+              <a:rPr lang="en-US" baseline="0" dirty="0" smtClean="0"/>
+              <a:t> we want to make sure that we are using ruby 1.9.3 because we know that it works with that config version. Run the rake task to create the app package, in the case of Android, an .</a:t>
+            </a:r>
+            <a:r>
+              <a:rPr lang="en-US" baseline="0" dirty="0" err="1" smtClean="0"/>
+              <a:t>apk</a:t>
+            </a:r>
+            <a:r>
+              <a:rPr lang="en-US" baseline="0" dirty="0" smtClean="0"/>
+              <a:t> file, and install the </a:t>
+            </a:r>
+            <a:r>
+              <a:rPr lang="en-US" baseline="0" dirty="0" err="1" smtClean="0"/>
+              <a:t>apk</a:t>
+            </a:r>
+            <a:r>
+              <a:rPr lang="en-US" baseline="0" dirty="0" smtClean="0"/>
+              <a:t> onto your device.</a:t>
+            </a:r>
+          </a:p>
+          <a:p>
+            <a:endParaRPr lang="en-US" baseline="0" dirty="0" smtClean="0"/>
+          </a:p>
+          <a:p>
+            <a:r>
+              <a:rPr lang="en-US" baseline="0" dirty="0" smtClean="0"/>
+              <a:t>Here is one we setup earlier so you can see how it works.</a:t>
+            </a:r>
+            <a:endParaRPr lang="en-US" dirty="0"/>
+          </a:p>
+        </p:txBody>
+      </p:sp>
+      <p:sp>
+        <p:nvSpPr>
+          <p:cNvPr id="4" name="Slide Number Placeholder 3"/>
+          <p:cNvSpPr>
+            <a:spLocks noGrp="1"/>
+          </p:cNvSpPr>
+          <p:nvPr>
+            <p:ph type="sldNum" sz="quarter" idx="10"/>
+          </p:nvPr>
+        </p:nvSpPr>
+        <p:spPr/>
+        <p:txBody>
+          <a:bodyPr/>
+          <a:lstStyle/>
+          <a:p>
+            <a:fld id="{D77A3FF8-68AA-A041-ADA3-194758FF0D5D}" type="slidenum">
+              <a:rPr lang="en-US" smtClean="0"/>
+              <a:pPr/>
+              <a:t>11</a:t>
+            </a:fld>
+            <a:endParaRPr lang="en-US"/>
+          </a:p>
+        </p:txBody>
+      </p:sp>
+    </p:spTree>
+    <p:extLst>
+      <p:ext uri="{BB962C8B-B14F-4D97-AF65-F5344CB8AC3E}">
+        <p14:creationId xmlns:p14="http://schemas.microsoft.com/office/powerpoint/2010/main" val="1321220486"/>
+      </p:ext>
+    </p:extLst>
+  </p:cSld>
+  <p:clrMapOvr>
+    <a:masterClrMapping/>
+  </p:clrMapOvr>
+</p:notes>
+</file>
+
+<file path=ppt/notesSlides/notesSlide11.xml><?xml version="1.0" encoding="utf-8"?>
+<p:notes xmlns:a="http://schemas.openxmlformats.org/drawingml/2006/main" xmlns:r="http://schemas.openxmlformats.org/officeDocument/2006/relationships" xmlns:p="http://schemas.openxmlformats.org/presentationml/2006/main">
+  <p:cSld>
+    <p:spTree>
+      <p:nvGrpSpPr>
+        <p:cNvPr id="1" name=""/>
+        <p:cNvGrpSpPr/>
+        <p:nvPr/>
+      </p:nvGrpSpPr>
+      <p:grpSpPr>
+        <a:xfrm>
+          <a:off x="0" y="0"/>
+          <a:ext cx="0" cy="0"/>
+          <a:chOff x="0" y="0"/>
+          <a:chExt cx="0" cy="0"/>
+        </a:xfrm>
+      </p:grpSpPr>
+      <p:sp>
+        <p:nvSpPr>
+          <p:cNvPr id="2" name="Slide Image Placeholder 1"/>
+          <p:cNvSpPr>
+            <a:spLocks noGrp="1" noRot="1" noChangeAspect="1"/>
+          </p:cNvSpPr>
+          <p:nvPr>
+            <p:ph type="sldImg"/>
+          </p:nvPr>
+        </p:nvSpPr>
+        <p:spPr/>
+      </p:sp>
+      <p:sp>
+        <p:nvSpPr>
+          <p:cNvPr id="3" name="Notes Placeholder 2"/>
+          <p:cNvSpPr>
+            <a:spLocks noGrp="1"/>
+          </p:cNvSpPr>
+          <p:nvPr>
+            <p:ph type="body" idx="1"/>
+          </p:nvPr>
+        </p:nvSpPr>
+        <p:spPr/>
+        <p:txBody>
+          <a:bodyPr/>
+          <a:lstStyle/>
+          <a:p>
+            <a:endParaRPr lang="en-US" dirty="0"/>
+          </a:p>
+        </p:txBody>
+      </p:sp>
+      <p:sp>
+        <p:nvSpPr>
+          <p:cNvPr id="4" name="Slide Number Placeholder 3"/>
+          <p:cNvSpPr>
+            <a:spLocks noGrp="1"/>
+          </p:cNvSpPr>
+          <p:nvPr>
+            <p:ph type="sldNum" sz="quarter" idx="10"/>
+          </p:nvPr>
+        </p:nvSpPr>
+        <p:spPr/>
+        <p:txBody>
+          <a:bodyPr/>
+          <a:lstStyle/>
+          <a:p>
+            <a:fld id="{D77A3FF8-68AA-A041-ADA3-194758FF0D5D}" type="slidenum">
+              <a:rPr lang="en-US" smtClean="0"/>
+              <a:pPr/>
+              <a:t>12</a:t>
+            </a:fld>
+            <a:endParaRPr lang="en-US"/>
+          </a:p>
+        </p:txBody>
+      </p:sp>
+    </p:spTree>
+    <p:extLst>
+      <p:ext uri="{BB962C8B-B14F-4D97-AF65-F5344CB8AC3E}">
+        <p14:creationId xmlns:p14="http://schemas.microsoft.com/office/powerpoint/2010/main" val="1147205294"/>
+      </p:ext>
+    </p:extLst>
+  </p:cSld>
+  <p:clrMapOvr>
+    <a:masterClrMapping/>
+  </p:clrMapOvr>
+</p:notes>
+</file>
+
+<file path=ppt/notesSlides/notesSlide12.xml><?xml version="1.0" encoding="utf-8"?>
+<p:notes xmlns:a="http://schemas.openxmlformats.org/drawingml/2006/main" xmlns:r="http://schemas.openxmlformats.org/officeDocument/2006/relationships" xmlns:p="http://schemas.openxmlformats.org/presentationml/2006/main">
+  <p:cSld>
+    <p:spTree>
+      <p:nvGrpSpPr>
+        <p:cNvPr id="1" name=""/>
+        <p:cNvGrpSpPr/>
+        <p:nvPr/>
+      </p:nvGrpSpPr>
+      <p:grpSpPr>
+        <a:xfrm>
+          <a:off x="0" y="0"/>
+          <a:ext cx="0" cy="0"/>
+          <a:chOff x="0" y="0"/>
+          <a:chExt cx="0" cy="0"/>
+        </a:xfrm>
+      </p:grpSpPr>
+      <p:sp>
+        <p:nvSpPr>
+          <p:cNvPr id="2" name="Slide Image Placeholder 1"/>
+          <p:cNvSpPr>
+            <a:spLocks noGrp="1" noRot="1" noChangeAspect="1"/>
+          </p:cNvSpPr>
+          <p:nvPr>
+            <p:ph type="sldImg"/>
+          </p:nvPr>
+        </p:nvSpPr>
+        <p:spPr/>
+      </p:sp>
+      <p:sp>
+        <p:nvSpPr>
+          <p:cNvPr id="3" name="Notes Placeholder 2"/>
+          <p:cNvSpPr>
+            <a:spLocks noGrp="1"/>
+          </p:cNvSpPr>
+          <p:nvPr>
+            <p:ph type="body" idx="1"/>
+          </p:nvPr>
+        </p:nvSpPr>
+        <p:spPr/>
+        <p:txBody>
+          <a:bodyPr/>
+          <a:lstStyle/>
+          <a:p>
+            <a:r>
+              <a:rPr lang="en-US" dirty="0" smtClean="0"/>
+              <a:t>Creating either your RC app or your client app in the cloud both</a:t>
+            </a:r>
+            <a:r>
+              <a:rPr lang="en-US" baseline="0" dirty="0" smtClean="0"/>
+              <a:t> start in the same place, creating a </a:t>
+            </a:r>
+            <a:r>
+              <a:rPr lang="en-US" baseline="0" dirty="0" err="1" smtClean="0"/>
+              <a:t>rhomobile.com</a:t>
+            </a:r>
+            <a:r>
+              <a:rPr lang="en-US" baseline="0" dirty="0" smtClean="0"/>
+              <a:t> account. One caveat to building in the cloud is, you must signup for either a silver or gold level subscription. The free tier of subscription does not support remote builds.</a:t>
+            </a:r>
+          </a:p>
+          <a:p>
+            <a:endParaRPr lang="en-US" baseline="0" dirty="0" smtClean="0"/>
+          </a:p>
+          <a:p>
+            <a:r>
+              <a:rPr lang="en-US" baseline="0" dirty="0" smtClean="0"/>
+              <a:t>Once you have signed up for your subscription on </a:t>
+            </a:r>
+            <a:r>
+              <a:rPr lang="en-US" baseline="0" dirty="0" err="1" smtClean="0"/>
+              <a:t>rhomobile.com</a:t>
+            </a:r>
+            <a:r>
+              <a:rPr lang="en-US" baseline="0" dirty="0" smtClean="0"/>
+              <a:t>, you’ll need to connect your local RhoConnect app directory to a remote </a:t>
+            </a:r>
+            <a:r>
+              <a:rPr lang="en-US" baseline="0" dirty="0" err="1" smtClean="0"/>
+              <a:t>github</a:t>
+            </a:r>
+            <a:r>
+              <a:rPr lang="en-US" baseline="0" dirty="0" smtClean="0"/>
+              <a:t> repo that will host your source code to be used in building your app.</a:t>
+            </a:r>
+          </a:p>
+          <a:p>
+            <a:endParaRPr lang="en-US" baseline="0" dirty="0" smtClean="0"/>
+          </a:p>
+          <a:p>
+            <a:r>
+              <a:rPr lang="en-US" baseline="0" dirty="0" smtClean="0"/>
+              <a:t>After building, you’ll deploy your app somewhere, like </a:t>
+            </a:r>
+            <a:r>
+              <a:rPr lang="en-US" baseline="0" dirty="0" err="1" smtClean="0"/>
+              <a:t>Heroku</a:t>
+            </a:r>
+            <a:r>
+              <a:rPr lang="en-US" baseline="0" dirty="0" smtClean="0"/>
+              <a:t> or some other such service, and it will be ready to connect to.</a:t>
+            </a:r>
+            <a:endParaRPr lang="en-US" dirty="0"/>
+          </a:p>
+        </p:txBody>
+      </p:sp>
+      <p:sp>
+        <p:nvSpPr>
+          <p:cNvPr id="4" name="Slide Number Placeholder 3"/>
+          <p:cNvSpPr>
+            <a:spLocks noGrp="1"/>
+          </p:cNvSpPr>
+          <p:nvPr>
+            <p:ph type="sldNum" sz="quarter" idx="10"/>
+          </p:nvPr>
+        </p:nvSpPr>
+        <p:spPr/>
+        <p:txBody>
+          <a:bodyPr/>
+          <a:lstStyle/>
+          <a:p>
+            <a:fld id="{D77A3FF8-68AA-A041-ADA3-194758FF0D5D}" type="slidenum">
+              <a:rPr lang="en-US" smtClean="0"/>
+              <a:pPr/>
+              <a:t>15</a:t>
+            </a:fld>
+            <a:endParaRPr lang="en-US"/>
+          </a:p>
+        </p:txBody>
+      </p:sp>
+    </p:spTree>
+    <p:extLst>
+      <p:ext uri="{BB962C8B-B14F-4D97-AF65-F5344CB8AC3E}">
+        <p14:creationId xmlns:p14="http://schemas.microsoft.com/office/powerpoint/2010/main" val="3470829639"/>
+      </p:ext>
+    </p:extLst>
+  </p:cSld>
+  <p:clrMapOvr>
+    <a:masterClrMapping/>
+  </p:clrMapOvr>
+</p:notes>
+</file>
+
+<file path=ppt/notesSlides/notesSlide13.xml><?xml version="1.0" encoding="utf-8"?>
+<p:notes xmlns:a="http://schemas.openxmlformats.org/drawingml/2006/main" xmlns:r="http://schemas.openxmlformats.org/officeDocument/2006/relationships" xmlns:p="http://schemas.openxmlformats.org/presentationml/2006/main">
+  <p:cSld>
+    <p:spTree>
+      <p:nvGrpSpPr>
+        <p:cNvPr id="1" name=""/>
+        <p:cNvGrpSpPr/>
+        <p:nvPr/>
+      </p:nvGrpSpPr>
+      <p:grpSpPr>
+        <a:xfrm>
+          <a:off x="0" y="0"/>
+          <a:ext cx="0" cy="0"/>
+          <a:chOff x="0" y="0"/>
+          <a:chExt cx="0" cy="0"/>
+        </a:xfrm>
+      </p:grpSpPr>
+      <p:sp>
+        <p:nvSpPr>
+          <p:cNvPr id="2" name="Slide Image Placeholder 1"/>
+          <p:cNvSpPr>
+            <a:spLocks noGrp="1" noRot="1" noChangeAspect="1"/>
+          </p:cNvSpPr>
+          <p:nvPr>
+            <p:ph type="sldImg"/>
+          </p:nvPr>
+        </p:nvSpPr>
+        <p:spPr/>
+      </p:sp>
+      <p:sp>
+        <p:nvSpPr>
+          <p:cNvPr id="3" name="Notes Placeholder 2"/>
+          <p:cNvSpPr>
+            <a:spLocks noGrp="1"/>
+          </p:cNvSpPr>
+          <p:nvPr>
+            <p:ph type="body" idx="1"/>
+          </p:nvPr>
+        </p:nvSpPr>
+        <p:spPr/>
+        <p:txBody>
+          <a:bodyPr/>
+          <a:lstStyle/>
+          <a:p>
+            <a:r>
+              <a:rPr lang="en-US" dirty="0" smtClean="0"/>
+              <a:t>Similarly to the</a:t>
+            </a:r>
+            <a:r>
+              <a:rPr lang="en-US" baseline="0" dirty="0" smtClean="0"/>
+              <a:t> previous steps, to create a client app in the cloud, you must create or login to your </a:t>
+            </a:r>
+            <a:r>
+              <a:rPr lang="en-US" baseline="0" dirty="0" err="1" smtClean="0"/>
+              <a:t>rhomobile.com</a:t>
+            </a:r>
+            <a:r>
+              <a:rPr lang="en-US" baseline="0" dirty="0" smtClean="0"/>
+              <a:t> account, link your local directory to the remote </a:t>
+            </a:r>
+            <a:r>
+              <a:rPr lang="en-US" baseline="0" dirty="0" err="1" smtClean="0"/>
+              <a:t>git</a:t>
+            </a:r>
+            <a:r>
+              <a:rPr lang="en-US" baseline="0" dirty="0" smtClean="0"/>
+              <a:t> repo, push your code, and tell it to build.</a:t>
+            </a:r>
+          </a:p>
+          <a:p>
+            <a:endParaRPr lang="en-US" baseline="0" dirty="0" smtClean="0"/>
+          </a:p>
+          <a:p>
+            <a:r>
+              <a:rPr lang="en-US" baseline="0" dirty="0" smtClean="0"/>
+              <a:t>Once your app is built, you’ll need to download it to your device, and install it.</a:t>
+            </a:r>
+            <a:endParaRPr lang="en-US" dirty="0"/>
+          </a:p>
+        </p:txBody>
+      </p:sp>
+      <p:sp>
+        <p:nvSpPr>
+          <p:cNvPr id="4" name="Slide Number Placeholder 3"/>
+          <p:cNvSpPr>
+            <a:spLocks noGrp="1"/>
+          </p:cNvSpPr>
+          <p:nvPr>
+            <p:ph type="sldNum" sz="quarter" idx="10"/>
+          </p:nvPr>
+        </p:nvSpPr>
+        <p:spPr/>
+        <p:txBody>
+          <a:bodyPr/>
+          <a:lstStyle/>
+          <a:p>
+            <a:fld id="{D77A3FF8-68AA-A041-ADA3-194758FF0D5D}" type="slidenum">
+              <a:rPr lang="en-US" smtClean="0"/>
+              <a:pPr/>
+              <a:t>16</a:t>
+            </a:fld>
+            <a:endParaRPr lang="en-US"/>
+          </a:p>
+        </p:txBody>
+      </p:sp>
+    </p:spTree>
+    <p:extLst>
+      <p:ext uri="{BB962C8B-B14F-4D97-AF65-F5344CB8AC3E}">
+        <p14:creationId xmlns:p14="http://schemas.microsoft.com/office/powerpoint/2010/main" val="2246239931"/>
+      </p:ext>
+    </p:extLst>
+  </p:cSld>
+  <p:clrMapOvr>
+    <a:masterClrMapping/>
+  </p:clrMapOvr>
+</p:notes>
+</file>
+
+<file path=ppt/notesSlides/notesSlide14.xml><?xml version="1.0" encoding="utf-8"?>
+<p:notes xmlns:a="http://schemas.openxmlformats.org/drawingml/2006/main" xmlns:r="http://schemas.openxmlformats.org/officeDocument/2006/relationships" xmlns:p="http://schemas.openxmlformats.org/presentationml/2006/main">
+  <p:cSld>
+    <p:spTree>
+      <p:nvGrpSpPr>
+        <p:cNvPr id="1" name=""/>
+        <p:cNvGrpSpPr/>
+        <p:nvPr/>
+      </p:nvGrpSpPr>
+      <p:grpSpPr>
+        <a:xfrm>
+          <a:off x="0" y="0"/>
+          <a:ext cx="0" cy="0"/>
+          <a:chOff x="0" y="0"/>
+          <a:chExt cx="0" cy="0"/>
+        </a:xfrm>
+      </p:grpSpPr>
+      <p:sp>
+        <p:nvSpPr>
+          <p:cNvPr id="2" name="Slide Image Placeholder 1"/>
+          <p:cNvSpPr>
+            <a:spLocks noGrp="1" noRot="1" noChangeAspect="1"/>
+          </p:cNvSpPr>
+          <p:nvPr>
+            <p:ph type="sldImg"/>
+          </p:nvPr>
+        </p:nvSpPr>
+        <p:spPr/>
+      </p:sp>
+      <p:sp>
+        <p:nvSpPr>
+          <p:cNvPr id="3" name="Notes Placeholder 2"/>
+          <p:cNvSpPr>
+            <a:spLocks noGrp="1"/>
+          </p:cNvSpPr>
+          <p:nvPr>
+            <p:ph type="body" idx="1"/>
+          </p:nvPr>
+        </p:nvSpPr>
+        <p:spPr/>
+        <p:txBody>
+          <a:bodyPr/>
+          <a:lstStyle/>
+          <a:p>
+            <a:endParaRPr lang="en-US" dirty="0"/>
+          </a:p>
+        </p:txBody>
+      </p:sp>
+      <p:sp>
+        <p:nvSpPr>
+          <p:cNvPr id="4" name="Slide Number Placeholder 3"/>
+          <p:cNvSpPr>
+            <a:spLocks noGrp="1"/>
+          </p:cNvSpPr>
+          <p:nvPr>
+            <p:ph type="sldNum" sz="quarter" idx="10"/>
+          </p:nvPr>
+        </p:nvSpPr>
+        <p:spPr/>
+        <p:txBody>
+          <a:bodyPr/>
+          <a:lstStyle/>
+          <a:p>
+            <a:fld id="{D77A3FF8-68AA-A041-ADA3-194758FF0D5D}" type="slidenum">
+              <a:rPr lang="en-US" smtClean="0"/>
+              <a:pPr/>
+              <a:t>17</a:t>
+            </a:fld>
+            <a:endParaRPr lang="en-US"/>
+          </a:p>
+        </p:txBody>
+      </p:sp>
+    </p:spTree>
+    <p:extLst>
+      <p:ext uri="{BB962C8B-B14F-4D97-AF65-F5344CB8AC3E}">
+        <p14:creationId xmlns:p14="http://schemas.microsoft.com/office/powerpoint/2010/main" val="1147205294"/>
+      </p:ext>
+    </p:extLst>
+  </p:cSld>
+  <p:clrMapOvr>
+    <a:masterClrMapping/>
+  </p:clrMapOvr>
+</p:notes>
+</file>
+
+<file path=ppt/notesSlides/notesSlide15.xml><?xml version="1.0" encoding="utf-8"?>
+<p:notes xmlns:a="http://schemas.openxmlformats.org/drawingml/2006/main" xmlns:r="http://schemas.openxmlformats.org/officeDocument/2006/relationships" xmlns:p="http://schemas.openxmlformats.org/presentationml/2006/main">
+  <p:cSld>
+    <p:spTree>
+      <p:nvGrpSpPr>
+        <p:cNvPr id="1" name=""/>
+        <p:cNvGrpSpPr/>
+        <p:nvPr/>
+      </p:nvGrpSpPr>
+      <p:grpSpPr>
+        <a:xfrm>
+          <a:off x="0" y="0"/>
+          <a:ext cx="0" cy="0"/>
+          <a:chOff x="0" y="0"/>
+          <a:chExt cx="0" cy="0"/>
+        </a:xfrm>
+      </p:grpSpPr>
+      <p:sp>
+        <p:nvSpPr>
+          <p:cNvPr id="2" name="Slide Image Placeholder 1"/>
+          <p:cNvSpPr>
+            <a:spLocks noGrp="1" noRot="1" noChangeAspect="1"/>
+          </p:cNvSpPr>
+          <p:nvPr>
+            <p:ph type="sldImg"/>
+          </p:nvPr>
+        </p:nvSpPr>
+        <p:spPr/>
+      </p:sp>
+      <p:sp>
+        <p:nvSpPr>
+          <p:cNvPr id="3" name="Notes Placeholder 2"/>
+          <p:cNvSpPr>
+            <a:spLocks noGrp="1"/>
+          </p:cNvSpPr>
+          <p:nvPr>
+            <p:ph type="body" idx="1"/>
+          </p:nvPr>
+        </p:nvSpPr>
+        <p:spPr/>
+        <p:txBody>
+          <a:bodyPr/>
+          <a:lstStyle/>
+          <a:p>
+            <a:r>
+              <a:rPr lang="en-US" dirty="0" smtClean="0"/>
+              <a:t>First we’ll need to create a vanilla</a:t>
+            </a:r>
+            <a:r>
+              <a:rPr lang="en-US" baseline="0" dirty="0" smtClean="0"/>
+              <a:t> RhoConnect app and a new rails app to work with. Once they are both created, we need to add the parts that will allow us to connect the two: add the ‘rhoconnect-</a:t>
+            </a:r>
+            <a:r>
+              <a:rPr lang="en-US" baseline="0" dirty="0" err="1" smtClean="0"/>
+              <a:t>rb</a:t>
+            </a:r>
+            <a:r>
+              <a:rPr lang="en-US" baseline="0" dirty="0" smtClean="0"/>
+              <a:t> gem into the </a:t>
+            </a:r>
+            <a:r>
+              <a:rPr lang="en-US" baseline="0" dirty="0" err="1" smtClean="0"/>
+              <a:t>Gemfile</a:t>
+            </a:r>
+            <a:r>
+              <a:rPr lang="en-US" baseline="0" dirty="0" smtClean="0"/>
+              <a:t>, setup RhoConnect as we usually would with the config, initializers etc., and edit our models to add actions to their </a:t>
+            </a:r>
+            <a:r>
+              <a:rPr lang="en-US" baseline="0" dirty="0" err="1" smtClean="0"/>
+              <a:t>rhoconnect_query</a:t>
+            </a:r>
+            <a:r>
+              <a:rPr lang="en-US" baseline="0" dirty="0" smtClean="0"/>
+              <a:t> method.</a:t>
+            </a:r>
+            <a:endParaRPr lang="en-US" dirty="0"/>
+          </a:p>
+        </p:txBody>
+      </p:sp>
+      <p:sp>
+        <p:nvSpPr>
+          <p:cNvPr id="4" name="Slide Number Placeholder 3"/>
+          <p:cNvSpPr>
+            <a:spLocks noGrp="1"/>
+          </p:cNvSpPr>
+          <p:nvPr>
+            <p:ph type="sldNum" sz="quarter" idx="10"/>
+          </p:nvPr>
+        </p:nvSpPr>
+        <p:spPr/>
+        <p:txBody>
+          <a:bodyPr/>
+          <a:lstStyle/>
+          <a:p>
+            <a:fld id="{D77A3FF8-68AA-A041-ADA3-194758FF0D5D}" type="slidenum">
+              <a:rPr lang="en-US" smtClean="0"/>
+              <a:pPr/>
+              <a:t>19</a:t>
+            </a:fld>
+            <a:endParaRPr lang="en-US"/>
+          </a:p>
+        </p:txBody>
+      </p:sp>
+    </p:spTree>
+    <p:extLst>
+      <p:ext uri="{BB962C8B-B14F-4D97-AF65-F5344CB8AC3E}">
+        <p14:creationId xmlns:p14="http://schemas.microsoft.com/office/powerpoint/2010/main" val="3606908596"/>
+      </p:ext>
+    </p:extLst>
+  </p:cSld>
+  <p:clrMapOvr>
+    <a:masterClrMapping/>
+  </p:clrMapOvr>
+</p:notes>
+</file>
+
+<file path=ppt/notesSlides/notesSlide16.xml><?xml version="1.0" encoding="utf-8"?>
+<p:notes xmlns:a="http://schemas.openxmlformats.org/drawingml/2006/main" xmlns:r="http://schemas.openxmlformats.org/officeDocument/2006/relationships" xmlns:p="http://schemas.openxmlformats.org/presentationml/2006/main">
+  <p:cSld>
+    <p:spTree>
+      <p:nvGrpSpPr>
+        <p:cNvPr id="1" name=""/>
+        <p:cNvGrpSpPr/>
+        <p:nvPr/>
+      </p:nvGrpSpPr>
+      <p:grpSpPr>
+        <a:xfrm>
+          <a:off x="0" y="0"/>
+          <a:ext cx="0" cy="0"/>
+          <a:chOff x="0" y="0"/>
+          <a:chExt cx="0" cy="0"/>
+        </a:xfrm>
+      </p:grpSpPr>
+      <p:sp>
+        <p:nvSpPr>
+          <p:cNvPr id="2" name="Slide Image Placeholder 1"/>
+          <p:cNvSpPr>
+            <a:spLocks noGrp="1" noRot="1" noChangeAspect="1"/>
+          </p:cNvSpPr>
+          <p:nvPr>
+            <p:ph type="sldImg"/>
+          </p:nvPr>
+        </p:nvSpPr>
+        <p:spPr/>
+      </p:sp>
+      <p:sp>
+        <p:nvSpPr>
+          <p:cNvPr id="3" name="Notes Placeholder 2"/>
+          <p:cNvSpPr>
+            <a:spLocks noGrp="1"/>
+          </p:cNvSpPr>
+          <p:nvPr>
+            <p:ph type="body" idx="1"/>
+          </p:nvPr>
+        </p:nvSpPr>
+        <p:spPr/>
+        <p:txBody>
+          <a:bodyPr/>
+          <a:lstStyle/>
+          <a:p>
+            <a:r>
+              <a:rPr lang="en-US" dirty="0" smtClean="0"/>
+              <a:t>As far as our client app is concerned, nothing needs to be changed</a:t>
+            </a:r>
+            <a:r>
+              <a:rPr lang="en-US" baseline="0" dirty="0" smtClean="0"/>
+              <a:t> in order for it to work with RhoConnect w/ plugins.</a:t>
+            </a:r>
+            <a:endParaRPr lang="en-US" dirty="0"/>
+          </a:p>
+        </p:txBody>
+      </p:sp>
+      <p:sp>
+        <p:nvSpPr>
+          <p:cNvPr id="4" name="Slide Number Placeholder 3"/>
+          <p:cNvSpPr>
+            <a:spLocks noGrp="1"/>
+          </p:cNvSpPr>
+          <p:nvPr>
+            <p:ph type="sldNum" sz="quarter" idx="10"/>
+          </p:nvPr>
+        </p:nvSpPr>
+        <p:spPr/>
+        <p:txBody>
+          <a:bodyPr/>
+          <a:lstStyle/>
+          <a:p>
+            <a:fld id="{D77A3FF8-68AA-A041-ADA3-194758FF0D5D}" type="slidenum">
+              <a:rPr lang="en-US" smtClean="0"/>
+              <a:pPr/>
+              <a:t>20</a:t>
+            </a:fld>
+            <a:endParaRPr lang="en-US"/>
+          </a:p>
+        </p:txBody>
+      </p:sp>
+    </p:spTree>
+    <p:extLst>
+      <p:ext uri="{BB962C8B-B14F-4D97-AF65-F5344CB8AC3E}">
+        <p14:creationId xmlns:p14="http://schemas.microsoft.com/office/powerpoint/2010/main" val="2760172637"/>
+      </p:ext>
+    </p:extLst>
+  </p:cSld>
+  <p:clrMapOvr>
+    <a:masterClrMapping/>
+  </p:clrMapOvr>
+</p:notes>
+</file>
+
+<file path=ppt/notesSlides/notesSlide17.xml><?xml version="1.0" encoding="utf-8"?>
+<p:notes xmlns:a="http://schemas.openxmlformats.org/drawingml/2006/main" xmlns:r="http://schemas.openxmlformats.org/officeDocument/2006/relationships" xmlns:p="http://schemas.openxmlformats.org/presentationml/2006/main">
+  <p:cSld>
+    <p:spTree>
+      <p:nvGrpSpPr>
+        <p:cNvPr id="1" name=""/>
+        <p:cNvGrpSpPr/>
+        <p:nvPr/>
+      </p:nvGrpSpPr>
+      <p:grpSpPr>
+        <a:xfrm>
+          <a:off x="0" y="0"/>
+          <a:ext cx="0" cy="0"/>
+          <a:chOff x="0" y="0"/>
+          <a:chExt cx="0" cy="0"/>
+        </a:xfrm>
+      </p:grpSpPr>
+      <p:sp>
+        <p:nvSpPr>
+          <p:cNvPr id="2" name="Slide Image Placeholder 1"/>
+          <p:cNvSpPr>
+            <a:spLocks noGrp="1" noRot="1" noChangeAspect="1"/>
+          </p:cNvSpPr>
+          <p:nvPr>
+            <p:ph type="sldImg"/>
+          </p:nvPr>
+        </p:nvSpPr>
+        <p:spPr/>
+      </p:sp>
+      <p:sp>
+        <p:nvSpPr>
+          <p:cNvPr id="3" name="Notes Placeholder 2"/>
+          <p:cNvSpPr>
+            <a:spLocks noGrp="1"/>
+          </p:cNvSpPr>
+          <p:nvPr>
+            <p:ph type="body" idx="1"/>
+          </p:nvPr>
+        </p:nvSpPr>
+        <p:spPr/>
+        <p:txBody>
+          <a:bodyPr/>
+          <a:lstStyle/>
+          <a:p>
+            <a:endParaRPr lang="en-US" dirty="0"/>
+          </a:p>
+        </p:txBody>
+      </p:sp>
+      <p:sp>
+        <p:nvSpPr>
+          <p:cNvPr id="4" name="Slide Number Placeholder 3"/>
+          <p:cNvSpPr>
+            <a:spLocks noGrp="1"/>
+          </p:cNvSpPr>
+          <p:nvPr>
+            <p:ph type="sldNum" sz="quarter" idx="10"/>
+          </p:nvPr>
+        </p:nvSpPr>
+        <p:spPr/>
+        <p:txBody>
+          <a:bodyPr/>
+          <a:lstStyle/>
+          <a:p>
+            <a:fld id="{D77A3FF8-68AA-A041-ADA3-194758FF0D5D}" type="slidenum">
+              <a:rPr lang="en-US" smtClean="0"/>
+              <a:pPr/>
+              <a:t>21</a:t>
+            </a:fld>
+            <a:endParaRPr lang="en-US"/>
+          </a:p>
+        </p:txBody>
+      </p:sp>
+    </p:spTree>
+    <p:extLst>
+      <p:ext uri="{BB962C8B-B14F-4D97-AF65-F5344CB8AC3E}">
+        <p14:creationId xmlns:p14="http://schemas.microsoft.com/office/powerpoint/2010/main" val="1147205294"/>
+      </p:ext>
+    </p:extLst>
+  </p:cSld>
+  <p:clrMapOvr>
+    <a:masterClrMapping/>
+  </p:clrMapOvr>
+</p:notes>
+</file>
+
+<file path=ppt/notesSlides/notesSlide18.xml><?xml version="1.0" encoding="utf-8"?>
+<p:notes xmlns:a="http://schemas.openxmlformats.org/drawingml/2006/main" xmlns:r="http://schemas.openxmlformats.org/officeDocument/2006/relationships" xmlns:p="http://schemas.openxmlformats.org/presentationml/2006/main">
+  <p:cSld>
+    <p:spTree>
+      <p:nvGrpSpPr>
+        <p:cNvPr id="1" name=""/>
+        <p:cNvGrpSpPr/>
+        <p:nvPr/>
+      </p:nvGrpSpPr>
+      <p:grpSpPr>
+        <a:xfrm>
+          <a:off x="0" y="0"/>
+          <a:ext cx="0" cy="0"/>
+          <a:chOff x="0" y="0"/>
+          <a:chExt cx="0" cy="0"/>
+        </a:xfrm>
+      </p:grpSpPr>
+      <p:sp>
+        <p:nvSpPr>
+          <p:cNvPr id="2" name="Slide Image Placeholder 1"/>
+          <p:cNvSpPr>
+            <a:spLocks noGrp="1" noRot="1" noChangeAspect="1"/>
+          </p:cNvSpPr>
+          <p:nvPr>
+            <p:ph type="sldImg"/>
+          </p:nvPr>
+        </p:nvSpPr>
+        <p:spPr/>
+      </p:sp>
+      <p:sp>
+        <p:nvSpPr>
+          <p:cNvPr id="3" name="Notes Placeholder 2"/>
+          <p:cNvSpPr>
+            <a:spLocks noGrp="1"/>
+          </p:cNvSpPr>
+          <p:nvPr>
+            <p:ph type="body" idx="1"/>
+          </p:nvPr>
+        </p:nvSpPr>
+        <p:spPr/>
+        <p:txBody>
+          <a:bodyPr/>
+          <a:lstStyle/>
+          <a:p>
+            <a:endParaRPr lang="en-US"/>
+          </a:p>
+        </p:txBody>
+      </p:sp>
+      <p:sp>
+        <p:nvSpPr>
+          <p:cNvPr id="4" name="Slide Number Placeholder 3"/>
+          <p:cNvSpPr>
+            <a:spLocks noGrp="1"/>
+          </p:cNvSpPr>
+          <p:nvPr>
+            <p:ph type="sldNum" sz="quarter" idx="10"/>
+          </p:nvPr>
+        </p:nvSpPr>
+        <p:spPr/>
+        <p:txBody>
+          <a:bodyPr/>
+          <a:lstStyle/>
+          <a:p>
+            <a:fld id="{D77A3FF8-68AA-A041-ADA3-194758FF0D5D}" type="slidenum">
+              <a:rPr lang="en-US" smtClean="0"/>
+              <a:pPr/>
+              <a:t>22</a:t>
+            </a:fld>
+            <a:endParaRPr lang="en-US"/>
+          </a:p>
+        </p:txBody>
+      </p:sp>
+    </p:spTree>
+    <p:extLst>
+      <p:ext uri="{BB962C8B-B14F-4D97-AF65-F5344CB8AC3E}">
+        <p14:creationId xmlns:p14="http://schemas.microsoft.com/office/powerpoint/2010/main" val="1248143595"/>
+      </p:ext>
+    </p:extLst>
+  </p:cSld>
+  <p:clrMapOvr>
+    <a:masterClrMapping/>
+  </p:clrMapOvr>
+</p:notes>
+</file>
+
 <file path=ppt/notesSlides/notesSlide2.xml><?xml version="1.0" encoding="utf-8"?>
 <p:notes xmlns:a="http://schemas.openxmlformats.org/drawingml/2006/main" xmlns:r="http://schemas.openxmlformats.org/officeDocument/2006/relationships" xmlns:p="http://schemas.openxmlformats.org/presentationml/2006/main">
   <p:cSld>
@@ -780,7 +1710,24 @@
           </a:bodyPr>
           <a:lstStyle/>
           <a:p>
-            <a:endParaRPr lang="en-US"/>
+            <a:r>
+              <a:rPr lang="en-US" dirty="0" smtClean="0"/>
+              <a:t>Before we start I feel that I should mention</a:t>
+            </a:r>
+            <a:r>
+              <a:rPr lang="en-US" baseline="0" dirty="0" smtClean="0"/>
+              <a:t> that we will be using mac OS commands for most of this session. It is not necessary that you use mac OS to use RhoConnect but there are some tools we will be using that are Mac OS only. Also, we highly recommend either Mac OS or Linux for RC development as the RC server is not supported for running on Windows machines.</a:t>
+            </a:r>
+          </a:p>
+          <a:p>
+            <a:endParaRPr lang="en-US" baseline="0" dirty="0" smtClean="0"/>
+          </a:p>
+          <a:p>
+            <a:r>
+              <a:rPr lang="en-US" baseline="0" dirty="0" smtClean="0"/>
+              <a:t>Also, I ask that all questions be held until the specified points in our presentation. Please write down any questions you have and ask later on in the session.</a:t>
+            </a:r>
+            <a:endParaRPr lang="en-US" dirty="0"/>
           </a:p>
         </p:txBody>
       </p:sp>
@@ -864,19 +1811,11 @@
           <a:p>
             <a:r>
               <a:rPr lang="en-US" dirty="0" smtClean="0"/>
-              <a:t>Split into two sections.  Give better examples. “This</a:t>
+              <a:t>You’re creating an</a:t>
             </a:r>
             <a:r>
               <a:rPr lang="en-US" baseline="0" dirty="0" smtClean="0"/>
-              <a:t> is an inherent problem with </a:t>
-            </a:r>
-            <a:r>
-              <a:rPr lang="en-US" baseline="0" dirty="0" err="1" smtClean="0"/>
-              <a:t>enterpise</a:t>
-            </a:r>
-            <a:r>
-              <a:rPr lang="en-US" baseline="0" dirty="0" smtClean="0"/>
-              <a:t> solutions”.</a:t>
+              <a:t> Enterprise mobile app but, you have a few problems, most of which stem from synchronization. As any of us who have manually rolled out a synchronization engine out know, it can be the most time consuming and aggravating part of your development cycle. What you need is some middle-ware that has already done all the hard work for you; for this we have created RhoConnect.</a:t>
             </a:r>
             <a:endParaRPr lang="en-US" dirty="0"/>
           </a:p>
@@ -958,6 +1897,10 @@
           <a:bodyPr/>
           <a:lstStyle/>
           <a:p>
+            <a:r>
+              <a:rPr lang="en-US" baseline="0" dirty="0" smtClean="0"/>
+              <a:t>RhoConnect solves the problems of scalability, performance constraints on low-resource devices, as well as other inherent enterprise solutions issues. With RhoConnect, all your business logic is separated from your app logic in such a way that RC can be used with virtually any front-end, not solely RhoMobile apps. That combined with the modern development tools and paradigms makes the entire process of setting up and maintaining your synchronization service much more enjoyable. RhoConnect also offers plugins to other programming languages so you can code in the language that best allows RhoConnect to handle sync with your environment. How RhoConnect does all this is quite complicated but maybe a visual representation of the architecture will help.</a:t>
+            </a:r>
             <a:endParaRPr lang="en-US" dirty="0"/>
           </a:p>
         </p:txBody>
@@ -980,7 +1923,7 @@
             <a:fld id="{D77A3FF8-68AA-A041-ADA3-194758FF0D5D}" type="slidenum">
               <a:rPr lang="en-US" smtClean="0"/>
               <a:pPr/>
-              <a:t>5</a:t>
+              <a:t>4</a:t>
             </a:fld>
             <a:endParaRPr lang="en-US"/>
           </a:p>
@@ -989,7 +1932,7 @@
     </p:spTree>
     <p:extLst>
       <p:ext uri="{BB962C8B-B14F-4D97-AF65-F5344CB8AC3E}">
-        <p14:creationId xmlns:p14="http://schemas.microsoft.com/office/powerpoint/2010/main" val="2319699562"/>
+        <p14:creationId xmlns:p14="http://schemas.microsoft.com/office/powerpoint/2010/main" val="3546403416"/>
       </p:ext>
     </p:extLst>
   </p:cSld>
@@ -1040,12 +1983,93 @@
         </p:nvSpPr>
         <p:spPr/>
         <p:txBody>
-          <a:bodyPr>
-            <a:normAutofit/>
-          </a:bodyPr>
+          <a:bodyPr/>
           <a:lstStyle/>
           <a:p>
-            <a:endParaRPr lang="en-US"/>
+            <a:r>
+              <a:rPr lang="en-US" dirty="0" smtClean="0"/>
+              <a:t>Here you can see how the RhoConnect app</a:t>
+            </a:r>
+            <a:r>
+              <a:rPr lang="en-US" baseline="0" dirty="0" smtClean="0"/>
+              <a:t> interacts with your front- and back-end. As shown here in the graphic, </a:t>
+            </a:r>
+            <a:r>
+              <a:rPr lang="en-US" baseline="0" dirty="0" err="1" smtClean="0"/>
+              <a:t>RhoConnect’s</a:t>
+            </a:r>
+            <a:r>
+              <a:rPr lang="en-US" baseline="0" dirty="0" smtClean="0"/>
+              <a:t> core engine performs all the complex sync, request brokering, and other messy processes and all the RC developer needs to worry about is the part or RC that handles the CRUD operations concerning the back-end. Our documentation describes this in more detail but all the RC </a:t>
+            </a:r>
+            <a:r>
+              <a:rPr lang="en-US" baseline="0" dirty="0" err="1" smtClean="0"/>
+              <a:t>dev</a:t>
+            </a:r>
+            <a:r>
+              <a:rPr lang="en-US" baseline="0" dirty="0" smtClean="0"/>
+              <a:t> would need to do is provide the RC app with the means by which to communicate with and perform CRUD operations with the back-end, which includes having models and controllers for each object that will have sync enabled.</a:t>
+            </a:r>
+            <a:br>
+              <a:rPr lang="en-US" baseline="0" dirty="0" smtClean="0"/>
+            </a:br>
+            <a:r>
+              <a:rPr lang="en-US" baseline="0" dirty="0" smtClean="0"/>
+              <a:t/>
+            </a:r>
+            <a:br>
+              <a:rPr lang="en-US" baseline="0" dirty="0" smtClean="0"/>
+            </a:br>
+            <a:r>
+              <a:rPr lang="en-US" baseline="0" dirty="0" smtClean="0"/>
+              <a:t>Details of the sync process:</a:t>
+            </a:r>
+            <a:br>
+              <a:rPr lang="en-US" baseline="0" dirty="0" smtClean="0"/>
+            </a:br>
+            <a:r>
+              <a:rPr lang="en-US" baseline="0" dirty="0" smtClean="0"/>
+              <a:t>1) Object created on device or back-end, sync is triggered.</a:t>
+            </a:r>
+          </a:p>
+          <a:p>
+            <a:r>
+              <a:rPr lang="en-US" baseline="0" dirty="0" smtClean="0"/>
+              <a:t>2) RC app receives sync request and processes the request using developer provided business logic.</a:t>
+            </a:r>
+          </a:p>
+          <a:p>
+            <a:r>
+              <a:rPr lang="en-US" baseline="0" dirty="0" smtClean="0"/>
+              <a:t>3) RC app checks the data in the RC app’s associated </a:t>
+            </a:r>
+            <a:r>
+              <a:rPr lang="en-US" baseline="0" dirty="0" err="1" smtClean="0"/>
+              <a:t>Redis</a:t>
+            </a:r>
+            <a:r>
+              <a:rPr lang="en-US" baseline="0" dirty="0" smtClean="0"/>
+              <a:t> server for diffs.</a:t>
+            </a:r>
+          </a:p>
+          <a:p>
+            <a:r>
+              <a:rPr lang="en-US" baseline="0" dirty="0" smtClean="0"/>
+              <a:t>4) Once RC has determined what is to be synced, the data is downloaded / uploaded to each location.</a:t>
+            </a:r>
+          </a:p>
+          <a:p>
+            <a:r>
+              <a:rPr lang="en-US" baseline="0" dirty="0" smtClean="0"/>
+              <a:t>5) After the sync, RC issues statuses on the sync to the device and the back-end to notify of any errors or successes.</a:t>
+            </a:r>
+          </a:p>
+          <a:p>
+            <a:r>
+              <a:rPr lang="en-US" baseline="0" dirty="0" smtClean="0"/>
+              <a:t>6) Sync concludes when objects on the device match the appropriate objects on the back-end.</a:t>
+            </a:r>
+            <a:endParaRPr lang="en-US" dirty="0"/>
           </a:p>
         </p:txBody>
       </p:sp>
@@ -1067,13 +2091,18 @@
             <a:fld id="{D77A3FF8-68AA-A041-ADA3-194758FF0D5D}" type="slidenum">
               <a:rPr lang="en-US" smtClean="0"/>
               <a:pPr/>
-              <a:t>6</a:t>
+              <a:t>5</a:t>
             </a:fld>
             <a:endParaRPr lang="en-US"/>
           </a:p>
         </p:txBody>
       </p:sp>
     </p:spTree>
+    <p:extLst>
+      <p:ext uri="{BB962C8B-B14F-4D97-AF65-F5344CB8AC3E}">
+        <p14:creationId xmlns:p14="http://schemas.microsoft.com/office/powerpoint/2010/main" val="2319699562"/>
+      </p:ext>
+    </p:extLst>
   </p:cSld>
   <p:clrMapOvr>
     <a:masterClrMapping/>
@@ -1122,25 +2151,11 @@
         </p:nvSpPr>
         <p:spPr/>
         <p:txBody>
-          <a:bodyPr/>
+          <a:bodyPr>
+            <a:normAutofit/>
+          </a:bodyPr>
           <a:lstStyle/>
           <a:p>
-            <a:r>
-              <a:rPr lang="en-US" dirty="0" smtClean="0"/>
-              <a:t>Include</a:t>
-            </a:r>
-            <a:r>
-              <a:rPr lang="en-US" baseline="0" dirty="0" smtClean="0"/>
-              <a:t> details regarding WHAT these </a:t>
-            </a:r>
-            <a:r>
-              <a:rPr lang="en-US" baseline="0" dirty="0" err="1" smtClean="0"/>
-              <a:t>comamnds</a:t>
-            </a:r>
-            <a:r>
-              <a:rPr lang="en-US" baseline="0" dirty="0" smtClean="0"/>
-              <a:t> are doing/used for</a:t>
-            </a:r>
             <a:endParaRPr lang="en-US" dirty="0"/>
           </a:p>
         </p:txBody>
@@ -1163,18 +2178,13 @@
             <a:fld id="{D77A3FF8-68AA-A041-ADA3-194758FF0D5D}" type="slidenum">
               <a:rPr lang="en-US" smtClean="0"/>
               <a:pPr/>
-              <a:t>9</a:t>
+              <a:t>6</a:t>
             </a:fld>
             <a:endParaRPr lang="en-US"/>
           </a:p>
         </p:txBody>
       </p:sp>
     </p:spTree>
-    <p:extLst>
-      <p:ext uri="{BB962C8B-B14F-4D97-AF65-F5344CB8AC3E}">
-        <p14:creationId xmlns:p14="http://schemas.microsoft.com/office/powerpoint/2010/main" val="434108648"/>
-      </p:ext>
-    </p:extLst>
   </p:cSld>
   <p:clrMapOvr>
     <a:masterClrMapping/>
@@ -1228,19 +2238,11 @@
           <a:p>
             <a:r>
               <a:rPr lang="en-US" dirty="0" smtClean="0"/>
-              <a:t>Before demo, build demo. Don’t show any CLI interface.</a:t>
+              <a:t>We have separated our demo into three</a:t>
             </a:r>
             <a:r>
               <a:rPr lang="en-US" baseline="0" dirty="0" smtClean="0"/>
-              <a:t> Have </a:t>
-            </a:r>
-            <a:r>
-              <a:rPr lang="en-US" baseline="0" dirty="0" err="1" smtClean="0"/>
-              <a:t>adb</a:t>
-            </a:r>
-            <a:r>
-              <a:rPr lang="en-US" baseline="0" dirty="0" smtClean="0"/>
-              <a:t> set up, ready to go</a:t>
+              <a:t> distinct exercises, Local RC, RC with plugins, RC without plugins in the cloud.</a:t>
             </a:r>
             <a:endParaRPr lang="en-US" dirty="0"/>
           </a:p>
@@ -1264,7 +2266,7 @@
             <a:fld id="{D77A3FF8-68AA-A041-ADA3-194758FF0D5D}" type="slidenum">
               <a:rPr lang="en-US" smtClean="0"/>
               <a:pPr/>
-              <a:t>11</a:t>
+              <a:t>7</a:t>
             </a:fld>
             <a:endParaRPr lang="en-US"/>
           </a:p>
@@ -1273,7 +2275,7 @@
     </p:spTree>
     <p:extLst>
       <p:ext uri="{BB962C8B-B14F-4D97-AF65-F5344CB8AC3E}">
-        <p14:creationId xmlns:p14="http://schemas.microsoft.com/office/powerpoint/2010/main" val="1321220486"/>
+        <p14:creationId xmlns:p14="http://schemas.microsoft.com/office/powerpoint/2010/main" val="552768344"/>
       </p:ext>
     </p:extLst>
   </p:cSld>
@@ -1327,7 +2329,23 @@
           <a:bodyPr/>
           <a:lstStyle/>
           <a:p>
-            <a:endParaRPr lang="en-US"/>
+            <a:r>
+              <a:rPr lang="en-US" dirty="0" smtClean="0"/>
+              <a:t>To</a:t>
+            </a:r>
+            <a:r>
+              <a:rPr lang="en-US" baseline="0" dirty="0" smtClean="0"/>
+              <a:t> setup a local RC server, you’ll first need to create your app using the ‘rhoconnect app’ command, create a source adapter that will correspond to your model on your client app. For our purposes, we’re making a source adapter called ‘Product’. Then you define your business logic for CRUD operations.</a:t>
+            </a:r>
+          </a:p>
+          <a:p>
+            <a:endParaRPr lang="en-US" baseline="0" dirty="0" smtClean="0"/>
+          </a:p>
+          <a:p>
+            <a:r>
+              <a:rPr lang="en-US" baseline="0" dirty="0" smtClean="0"/>
+              <a:t>We are going to just skip past the business logic and CRUD operations and go straight to the creation of the client app.</a:t>
+            </a:r>
           </a:p>
         </p:txBody>
       </p:sp>
@@ -1349,7 +2367,7 @@
             <a:fld id="{D77A3FF8-68AA-A041-ADA3-194758FF0D5D}" type="slidenum">
               <a:rPr lang="en-US" smtClean="0"/>
               <a:pPr/>
-              <a:t>21</a:t>
+              <a:t>9</a:t>
             </a:fld>
             <a:endParaRPr lang="en-US"/>
           </a:p>
@@ -1358,7 +2376,120 @@
     </p:spTree>
     <p:extLst>
       <p:ext uri="{BB962C8B-B14F-4D97-AF65-F5344CB8AC3E}">
-        <p14:creationId xmlns:p14="http://schemas.microsoft.com/office/powerpoint/2010/main" val="1248143595"/>
+        <p14:creationId xmlns:p14="http://schemas.microsoft.com/office/powerpoint/2010/main" val="434108648"/>
+      </p:ext>
+    </p:extLst>
+  </p:cSld>
+  <p:clrMapOvr>
+    <a:masterClrMapping/>
+  </p:clrMapOvr>
+</p:notes>
+</file>
+
+<file path=ppt/notesSlides/notesSlide9.xml><?xml version="1.0" encoding="utf-8"?>
+<p:notes xmlns:a="http://schemas.openxmlformats.org/drawingml/2006/main" xmlns:r="http://schemas.openxmlformats.org/officeDocument/2006/relationships" xmlns:p="http://schemas.openxmlformats.org/presentationml/2006/main">
+  <p:cSld>
+    <p:spTree>
+      <p:nvGrpSpPr>
+        <p:cNvPr id="1" name=""/>
+        <p:cNvGrpSpPr/>
+        <p:nvPr/>
+      </p:nvGrpSpPr>
+      <p:grpSpPr>
+        <a:xfrm>
+          <a:off x="0" y="0"/>
+          <a:ext cx="0" cy="0"/>
+          <a:chOff x="0" y="0"/>
+          <a:chExt cx="0" cy="0"/>
+        </a:xfrm>
+      </p:grpSpPr>
+      <p:sp>
+        <p:nvSpPr>
+          <p:cNvPr id="2" name="Slide Image Placeholder 1"/>
+          <p:cNvSpPr>
+            <a:spLocks noGrp="1" noRot="1" noChangeAspect="1"/>
+          </p:cNvSpPr>
+          <p:nvPr>
+            <p:ph type="sldImg"/>
+          </p:nvPr>
+        </p:nvSpPr>
+        <p:spPr/>
+      </p:sp>
+      <p:sp>
+        <p:nvSpPr>
+          <p:cNvPr id="3" name="Notes Placeholder 2"/>
+          <p:cNvSpPr>
+            <a:spLocks noGrp="1"/>
+          </p:cNvSpPr>
+          <p:nvPr>
+            <p:ph type="body" idx="1"/>
+          </p:nvPr>
+        </p:nvSpPr>
+        <p:spPr/>
+        <p:txBody>
+          <a:bodyPr/>
+          <a:lstStyle/>
+          <a:p>
+            <a:r>
+              <a:rPr lang="en-US" dirty="0" smtClean="0"/>
+              <a:t>If you attended the Rho </a:t>
+            </a:r>
+            <a:r>
+              <a:rPr lang="en-US" dirty="0" err="1" smtClean="0"/>
+              <a:t>bootcamp</a:t>
+            </a:r>
+            <a:r>
+              <a:rPr lang="en-US" baseline="0" dirty="0" smtClean="0"/>
+              <a:t> session, you should know this already but we’ll go over it quickly. First, create your app with the ‘rhodes app’ command and create the model that corresponds to your RC source adapter. Set your syncserver in your rhoconfig.txt. Add a link to your Product’s page in your app/</a:t>
+            </a:r>
+            <a:r>
+              <a:rPr lang="en-US" baseline="0" dirty="0" err="1" smtClean="0"/>
+              <a:t>index.erb</a:t>
+            </a:r>
+            <a:r>
+              <a:rPr lang="en-US" baseline="0" dirty="0" smtClean="0"/>
+              <a:t> and enable sync for that model in your model’s .</a:t>
+            </a:r>
+            <a:r>
+              <a:rPr lang="en-US" baseline="0" dirty="0" err="1" smtClean="0"/>
+              <a:t>rb</a:t>
+            </a:r>
+            <a:r>
+              <a:rPr lang="en-US" baseline="0" dirty="0" smtClean="0"/>
+              <a:t> file.</a:t>
+            </a:r>
+            <a:endParaRPr lang="en-US" dirty="0"/>
+          </a:p>
+        </p:txBody>
+      </p:sp>
+      <p:sp>
+        <p:nvSpPr>
+          <p:cNvPr id="4" name="Slide Number Placeholder 3"/>
+          <p:cNvSpPr>
+            <a:spLocks noGrp="1"/>
+          </p:cNvSpPr>
+          <p:nvPr>
+            <p:ph type="sldNum" sz="quarter" idx="10"/>
+          </p:nvPr>
+        </p:nvSpPr>
+        <p:spPr/>
+        <p:txBody>
+          <a:bodyPr/>
+          <a:lstStyle/>
+          <a:p>
+            <a:fld id="{D77A3FF8-68AA-A041-ADA3-194758FF0D5D}" type="slidenum">
+              <a:rPr lang="en-US" smtClean="0"/>
+              <a:pPr/>
+              <a:t>10</a:t>
+            </a:fld>
+            <a:endParaRPr lang="en-US"/>
+          </a:p>
+        </p:txBody>
+      </p:sp>
+    </p:spTree>
+    <p:extLst>
+      <p:ext uri="{BB962C8B-B14F-4D97-AF65-F5344CB8AC3E}">
+        <p14:creationId xmlns:p14="http://schemas.microsoft.com/office/powerpoint/2010/main" val="3388044747"/>
       </p:ext>
     </p:extLst>
   </p:cSld>
@@ -12093,12 +13224,8 @@
           <a:lstStyle/>
           <a:p>
             <a:r>
-              <a:rPr lang="en-US" dirty="0" err="1" smtClean="0"/>
-              <a:t>StoreManager</a:t>
-            </a:r>
-            <a:r>
               <a:rPr lang="en-US" dirty="0" smtClean="0"/>
-              <a:t> - local</a:t>
+              <a:t>StoreManager - local</a:t>
             </a:r>
             <a:endParaRPr lang="en-US" dirty="0"/>
           </a:p>
@@ -12125,30 +13252,14 @@
             </a:pPr>
             <a:r>
               <a:rPr lang="en-US" dirty="0" smtClean="0"/>
-              <a:t>‘</a:t>
-            </a:r>
-            <a:r>
-              <a:rPr lang="en-US" dirty="0" err="1" smtClean="0"/>
-              <a:t>rhodes</a:t>
-            </a:r>
+              <a:t>‘rhodes app store-manager’</a:t>
+            </a:r>
+          </a:p>
+          <a:p>
+            <a:pPr marL="1085850" lvl="1" indent="-342900"/>
             <a:r>
               <a:rPr lang="en-US" dirty="0" smtClean="0"/>
-              <a:t> app store-manager’</a:t>
-            </a:r>
-          </a:p>
-          <a:p>
-            <a:pPr marL="1085850" lvl="1" indent="-342900"/>
-            <a:r>
-              <a:rPr lang="en-US" dirty="0" smtClean="0"/>
-              <a:t>Create </a:t>
-            </a:r>
-            <a:r>
-              <a:rPr lang="en-US" dirty="0" err="1" smtClean="0"/>
-              <a:t>rhodes</a:t>
-            </a:r>
-            <a:r>
-              <a:rPr lang="en-US" dirty="0" smtClean="0"/>
-              <a:t> client application called store-manager</a:t>
+              <a:t>Create rhodes client application called store-manager</a:t>
             </a:r>
           </a:p>
           <a:p>
@@ -12162,21 +13273,20 @@
             </a:r>
           </a:p>
           <a:p>
+            <a:pPr marL="1085850" lvl="1" indent="-342900"/>
+            <a:r>
+              <a:rPr lang="en-US" dirty="0" smtClean="0"/>
+              <a:t>Change into the app dir.</a:t>
+            </a:r>
+          </a:p>
+          <a:p>
             <a:pPr marL="342900" indent="-342900">
               <a:buFont typeface="Arial"/>
               <a:buChar char="•"/>
             </a:pPr>
             <a:r>
               <a:rPr lang="en-US" dirty="0" smtClean="0"/>
-              <a:t>‘</a:t>
-            </a:r>
-            <a:r>
-              <a:rPr lang="en-US" dirty="0" err="1" smtClean="0"/>
-              <a:t>rhodes</a:t>
-            </a:r>
-            <a:r>
-              <a:rPr lang="en-US" dirty="0" smtClean="0"/>
-              <a:t> model product </a:t>
+              <a:t>‘rhodes model product </a:t>
             </a:r>
             <a:r>
               <a:rPr lang="en-US" dirty="0" err="1" smtClean="0"/>
@@ -12191,15 +13301,7 @@
             <a:pPr marL="1085850" lvl="1" indent="-342900"/>
             <a:r>
               <a:rPr lang="en-US" dirty="0" smtClean="0"/>
-              <a:t>Create </a:t>
-            </a:r>
-            <a:r>
-              <a:rPr lang="en-US" dirty="0" err="1" smtClean="0"/>
-              <a:t>rhodes</a:t>
-            </a:r>
-            <a:r>
-              <a:rPr lang="en-US" dirty="0" smtClean="0"/>
-              <a:t> model called ‘product’ with fields ‘brand’, ‘name’, ‘price’, ‘quantity’, ‘</a:t>
+              <a:t>Create rhodes model called ‘product’ with fields ‘brand’, ‘name’, ‘price’, ‘quantity’, ‘</a:t>
             </a:r>
             <a:r>
               <a:rPr lang="en-US" dirty="0" err="1" smtClean="0"/>
@@ -12229,15 +13331,7 @@
             <a:pPr marL="1085850" lvl="1" indent="-342900"/>
             <a:r>
               <a:rPr lang="en-US" dirty="0" smtClean="0"/>
-              <a:t>Add/edit: </a:t>
-            </a:r>
-            <a:r>
-              <a:rPr lang="en-US" dirty="0" err="1" smtClean="0"/>
-              <a:t>syncserver</a:t>
-            </a:r>
-            <a:r>
-              <a:rPr lang="en-US" dirty="0" smtClean="0"/>
-              <a:t> = ‘http://&lt;insert local </a:t>
+              <a:t>Add/edit: syncserver = ‘http://&lt;insert local </a:t>
             </a:r>
             <a:r>
               <a:rPr lang="en-US" dirty="0" err="1" smtClean="0"/>
@@ -12333,12 +13427,8 @@
           <a:lstStyle/>
           <a:p>
             <a:r>
-              <a:rPr lang="en-US" dirty="0" err="1" smtClean="0"/>
-              <a:t>StoreManager</a:t>
-            </a:r>
-            <a:r>
               <a:rPr lang="en-US" dirty="0" smtClean="0"/>
-              <a:t> – local (</a:t>
+              <a:t>StoreManager – local (</a:t>
             </a:r>
             <a:r>
               <a:rPr lang="en-US" dirty="0" err="1" smtClean="0"/>
@@ -12730,7 +13820,11 @@
           <a:p>
             <a:r>
               <a:rPr lang="en-US" dirty="0" smtClean="0"/>
-              <a:t>RhoConnect - cloud</a:t>
+              <a:t>RhoConnect - </a:t>
+            </a:r>
+            <a:r>
+              <a:rPr lang="en-US" dirty="0" smtClean="0"/>
+              <a:t>Cloud</a:t>
             </a:r>
             <a:endParaRPr lang="en-US" dirty="0"/>
           </a:p>
@@ -12918,12 +14012,12 @@
           <a:lstStyle/>
           <a:p>
             <a:r>
-              <a:rPr lang="en-US" dirty="0" err="1" smtClean="0"/>
-              <a:t>StoreManager</a:t>
-            </a:r>
-            <a:r>
               <a:rPr lang="en-US" dirty="0" smtClean="0"/>
-              <a:t> - cloud</a:t>
+              <a:t>StoreManager - </a:t>
+            </a:r>
+            <a:r>
+              <a:rPr lang="en-US" dirty="0" smtClean="0"/>
+              <a:t>Cloud</a:t>
             </a:r>
             <a:endParaRPr lang="en-US" dirty="0"/>
           </a:p>
@@ -12965,31 +14059,23 @@
             <a:pPr marL="1085850" lvl="1" indent="-342900"/>
             <a:r>
               <a:rPr lang="en-US" dirty="0" smtClean="0"/>
+              <a:t>syncserver </a:t>
+            </a:r>
+            <a:r>
+              <a:rPr lang="en-US" dirty="0" smtClean="0"/>
+              <a:t>= </a:t>
+            </a:r>
+            <a:r>
+              <a:rPr lang="en-US" dirty="0" smtClean="0"/>
               <a:t>“</a:t>
             </a:r>
             <a:r>
-              <a:rPr lang="en-US" dirty="0" err="1" smtClean="0"/>
-              <a:t>syncserver</a:t>
-            </a:r>
-            <a:r>
               <a:rPr lang="en-US" dirty="0" smtClean="0"/>
-              <a:t> = ‘</a:t>
-            </a:r>
-            <a:r>
-              <a:rPr lang="en-US" dirty="0" err="1" smtClean="0"/>
-              <a:t>rhohub</a:t>
+              <a:t>&lt;</a:t>
             </a:r>
             <a:r>
               <a:rPr lang="en-US" dirty="0" smtClean="0"/>
-              <a:t>-…</a:t>
-            </a:r>
-            <a:r>
-              <a:rPr lang="en-US" dirty="0" err="1" smtClean="0"/>
-              <a:t>herokuapp.com</a:t>
-            </a:r>
-            <a:r>
-              <a:rPr lang="en-US" dirty="0" smtClean="0"/>
-              <a:t>’”</a:t>
+              <a:t>your-backend&gt;”</a:t>
             </a:r>
             <a:endParaRPr lang="en-US" dirty="0"/>
           </a:p>
@@ -13019,13 +14105,22 @@
               <a:t>Create </a:t>
             </a:r>
             <a:r>
-              <a:rPr lang="en-US" dirty="0" err="1"/>
-              <a:t>rhomobile</a:t>
-            </a:r>
-            <a:r>
-              <a:rPr lang="en-US" dirty="0"/>
-              <a:t> rhoconnect application</a:t>
-            </a:r>
+              <a:rPr lang="en-US" dirty="0" smtClean="0"/>
+              <a:t>R</a:t>
+            </a:r>
+            <a:r>
+              <a:rPr lang="en-US" dirty="0" smtClean="0"/>
+              <a:t>hoMobile </a:t>
+            </a:r>
+            <a:r>
+              <a:rPr lang="en-US" dirty="0" smtClean="0"/>
+              <a:t>R</a:t>
+            </a:r>
+            <a:r>
+              <a:rPr lang="en-US" dirty="0" smtClean="0"/>
+              <a:t>hoConnect app</a:t>
+            </a:r>
+            <a:endParaRPr lang="en-US" dirty="0"/>
           </a:p>
           <a:p>
             <a:pPr marL="1085850" lvl="1" indent="-342900"/>
@@ -13097,8 +14192,12 @@
               <a:t>Build on </a:t>
             </a:r>
             <a:r>
+              <a:rPr lang="en-US" dirty="0" err="1"/>
+              <a:t>r</a:t>
+            </a:r>
+            <a:r>
               <a:rPr lang="en-US" dirty="0" err="1" smtClean="0"/>
-              <a:t>RhoMobile.com</a:t>
+              <a:t>homobile.com</a:t>
             </a:r>
             <a:endParaRPr lang="en-US" dirty="0" smtClean="0"/>
           </a:p>
@@ -13109,7 +14208,11 @@
             </a:pPr>
             <a:r>
               <a:rPr lang="en-US" dirty="0" smtClean="0"/>
-              <a:t>Download on device</a:t>
+              <a:t>Download </a:t>
+            </a:r>
+            <a:r>
+              <a:rPr lang="en-US" dirty="0" smtClean="0"/>
+              <a:t>to device</a:t>
             </a:r>
             <a:endParaRPr lang="en-US" dirty="0"/>
           </a:p>
@@ -13160,8 +14263,8 @@
         </p:nvSpPr>
         <p:spPr>
           <a:xfrm>
-            <a:off x="276458" y="1889010"/>
-            <a:ext cx="8127828" cy="918200"/>
+            <a:off x="276458" y="1119569"/>
+            <a:ext cx="8127828" cy="1687641"/>
           </a:xfrm>
         </p:spPr>
         <p:txBody>
@@ -13169,8 +14272,12 @@
           <a:lstStyle/>
           <a:p>
             <a:r>
-              <a:rPr lang="en-US" dirty="0" smtClean="0"/>
-              <a:t>RhoConnect Plugin</a:t>
+              <a:rPr lang="en-US" smtClean="0"/>
+              <a:t>RHOCONNECT </a:t>
+            </a:r>
+            <a:r>
+              <a:rPr lang="en-US" smtClean="0"/>
+              <a:t>CLOUD DEMO </a:t>
             </a:r>
             <a:endParaRPr lang="en-US" dirty="0"/>
           </a:p>
@@ -13179,13 +14286,20 @@
     </p:spTree>
     <p:extLst>
       <p:ext uri="{BB962C8B-B14F-4D97-AF65-F5344CB8AC3E}">
-        <p14:creationId xmlns:p14="http://schemas.microsoft.com/office/powerpoint/2010/main" val="688618394"/>
+        <p14:creationId xmlns:p14="http://schemas.microsoft.com/office/powerpoint/2010/main" val="755665567"/>
       </p:ext>
     </p:extLst>
   </p:cSld>
   <p:clrMapOvr>
     <a:masterClrMapping/>
   </p:clrMapOvr>
+  <p:timing>
+    <p:tnLst>
+      <p:par>
+        <p:cTn xmlns:p14="http://schemas.microsoft.com/office/powerpoint/2010/main" id="1" dur="indefinite" restart="never" nodeType="tmRoot"/>
+      </p:par>
+    </p:tnLst>
+  </p:timing>
 </p:sld>
 </file>
 
@@ -13208,105 +14322,42 @@
       </p:grpSpPr>
       <p:sp>
         <p:nvSpPr>
-          <p:cNvPr id="2" name="Title 1"/>
+          <p:cNvPr id="2" name="Text Placeholder 1"/>
           <p:cNvSpPr>
             <a:spLocks noGrp="1"/>
           </p:cNvSpPr>
           <p:nvPr>
-            <p:ph type="title"/>
+            <p:ph type="body" sz="quarter" idx="10"/>
           </p:nvPr>
         </p:nvSpPr>
-        <p:spPr/>
+        <p:spPr>
+          <a:xfrm>
+            <a:off x="276458" y="1889010"/>
+            <a:ext cx="8127828" cy="918200"/>
+          </a:xfrm>
+        </p:spPr>
         <p:txBody>
           <a:bodyPr/>
           <a:lstStyle/>
           <a:p>
             <a:r>
               <a:rPr lang="en-US" dirty="0" smtClean="0"/>
-              <a:t>RhoConnect with plugin</a:t>
+              <a:t>RhoConnect Plugin</a:t>
             </a:r>
             <a:endParaRPr lang="en-US" dirty="0"/>
-          </a:p>
-        </p:txBody>
-      </p:sp>
-      <p:sp>
-        <p:nvSpPr>
-          <p:cNvPr id="3" name="Content Placeholder 2"/>
-          <p:cNvSpPr>
-            <a:spLocks noGrp="1"/>
-          </p:cNvSpPr>
-          <p:nvPr>
-            <p:ph idx="1"/>
-          </p:nvPr>
-        </p:nvSpPr>
-        <p:spPr/>
-        <p:txBody>
-          <a:bodyPr/>
-          <a:lstStyle/>
-          <a:p>
-            <a:pPr marL="342900" indent="-342900">
-              <a:buAutoNum type="arabicPeriod"/>
-            </a:pPr>
-            <a:r>
-              <a:rPr lang="en-US" dirty="0" smtClean="0"/>
-              <a:t>‘rhoconnect app rhoconnect-vanilla’</a:t>
-            </a:r>
-          </a:p>
-          <a:p>
-            <a:pPr marL="1085850" lvl="1" indent="-342900">
-              <a:buAutoNum type="arabicPeriod"/>
-            </a:pPr>
-            <a:r>
-              <a:rPr lang="en-US" dirty="0" smtClean="0"/>
-              <a:t>Create purely vanilla rhoconnect application</a:t>
-            </a:r>
-            <a:endParaRPr lang="en-US" dirty="0"/>
-          </a:p>
-          <a:p>
-            <a:pPr marL="1085850" lvl="1" indent="-342900">
-              <a:buAutoNum type="arabicPeriod"/>
-            </a:pPr>
-            <a:r>
-              <a:rPr lang="en-US" dirty="0" smtClean="0"/>
-              <a:t>Optional, just start rhoconnect anonymous server</a:t>
-            </a:r>
-          </a:p>
-          <a:p>
-            <a:pPr marL="1485900" lvl="2" indent="-342900">
-              <a:buAutoNum type="arabicPeriod"/>
-            </a:pPr>
-            <a:r>
-              <a:rPr lang="en-US" dirty="0" smtClean="0"/>
-              <a:t>‘</a:t>
-            </a:r>
-            <a:r>
-              <a:rPr lang="en-US" dirty="0"/>
-              <a:t>rhoconnect </a:t>
-            </a:r>
-            <a:r>
-              <a:rPr lang="en-US" dirty="0" smtClean="0"/>
-              <a:t>start’</a:t>
-            </a:r>
           </a:p>
         </p:txBody>
       </p:sp>
     </p:spTree>
     <p:extLst>
       <p:ext uri="{BB962C8B-B14F-4D97-AF65-F5344CB8AC3E}">
-        <p14:creationId xmlns:p14="http://schemas.microsoft.com/office/powerpoint/2010/main" val="1014730717"/>
+        <p14:creationId xmlns:p14="http://schemas.microsoft.com/office/powerpoint/2010/main" val="688618394"/>
       </p:ext>
     </p:extLst>
   </p:cSld>
   <p:clrMapOvr>
     <a:masterClrMapping/>
   </p:clrMapOvr>
-  <p:timing>
-    <p:tnLst>
-      <p:par>
-        <p:cTn xmlns:p14="http://schemas.microsoft.com/office/powerpoint/2010/main" id="1" dur="indefinite" restart="never" nodeType="tmRoot"/>
-      </p:par>
-    </p:tnLst>
-  </p:timing>
 </p:sld>
 </file>
 
@@ -13343,8 +14394,8 @@
           <a:lstStyle/>
           <a:p>
             <a:r>
-              <a:rPr lang="en-US" dirty="0" err="1" smtClean="0"/>
-              <a:t>RhoStore</a:t>
+              <a:rPr lang="en-US" dirty="0" smtClean="0"/>
+              <a:t>RhoConnect and Rails Apps</a:t>
             </a:r>
             <a:endParaRPr lang="en-US" dirty="0"/>
           </a:p>
@@ -13365,48 +14416,101 @@
           <a:bodyPr/>
           <a:lstStyle/>
           <a:p>
-            <a:pPr marL="285750" indent="-285750">
-              <a:buFont typeface="Arial"/>
-              <a:buChar char="•"/>
+            <a:pPr marL="342900" indent="-342900">
+              <a:buFont typeface="+mj-lt"/>
+              <a:buAutoNum type="arabicPeriod"/>
             </a:pPr>
             <a:r>
               <a:rPr lang="en-US" dirty="0" smtClean="0"/>
+              <a:t>‘rhoconnect app rhoconnect-vanilla’</a:t>
+            </a:r>
+          </a:p>
+          <a:p>
+            <a:pPr marL="1085850" lvl="1" indent="-342900"/>
+            <a:r>
+              <a:rPr lang="en-US" dirty="0" smtClean="0"/>
+              <a:t>Create purely vanilla rhoconnect </a:t>
+            </a:r>
+            <a:r>
+              <a:rPr lang="en-US" dirty="0" smtClean="0"/>
+              <a:t>application.</a:t>
+            </a:r>
+            <a:endParaRPr lang="en-US" dirty="0"/>
+          </a:p>
+          <a:p>
+            <a:pPr marL="1085850" lvl="1" indent="-342900"/>
+            <a:r>
+              <a:rPr lang="en-US" dirty="0" smtClean="0"/>
+              <a:t>Optionally </a:t>
+            </a:r>
+            <a:r>
+              <a:rPr lang="en-US" dirty="0" smtClean="0"/>
+              <a:t>just start rhoconnect anonymous </a:t>
+            </a:r>
+            <a:r>
+              <a:rPr lang="en-US" dirty="0" smtClean="0"/>
+              <a:t>server.</a:t>
+            </a:r>
+          </a:p>
+          <a:p>
+            <a:pPr marL="1485900" lvl="2" indent="-342900"/>
+            <a:r>
+              <a:rPr lang="en-US" dirty="0" smtClean="0"/>
+              <a:t>‘rhoconnect </a:t>
+            </a:r>
+            <a:r>
+              <a:rPr lang="en-US" dirty="0" smtClean="0"/>
+              <a:t>start</a:t>
+            </a:r>
+            <a:r>
+              <a:rPr lang="en-US" dirty="0" smtClean="0"/>
+              <a:t>’</a:t>
+            </a:r>
+          </a:p>
+          <a:p>
+            <a:pPr marL="342900" indent="-342900">
+              <a:buFont typeface="+mj-lt"/>
+              <a:buAutoNum type="arabicPeriod"/>
+            </a:pPr>
+            <a:r>
+              <a:rPr lang="en-US" dirty="0"/>
               <a:t>‘rails new </a:t>
             </a:r>
             <a:r>
-              <a:rPr lang="en-US" dirty="0" err="1" smtClean="0"/>
+              <a:rPr lang="en-US" dirty="0" err="1"/>
               <a:t>rhostore</a:t>
             </a:r>
             <a:r>
+              <a:rPr lang="en-US" dirty="0"/>
+              <a:t>-with-plugin’</a:t>
+            </a:r>
+          </a:p>
+          <a:p>
+            <a:pPr marL="1028700" lvl="1"/>
+            <a:r>
+              <a:rPr lang="en-US" dirty="0"/>
+              <a:t>Create a new rails </a:t>
+            </a:r>
+            <a:r>
               <a:rPr lang="en-US" dirty="0" smtClean="0"/>
-              <a:t>-with-plugin’</a:t>
-            </a:r>
-          </a:p>
-          <a:p>
-            <a:pPr marL="685800" lvl="2"/>
+              <a:t>app.</a:t>
+            </a:r>
+            <a:endParaRPr lang="en-US" dirty="0"/>
+          </a:p>
+          <a:p>
+            <a:pPr marL="342900" indent="-342900">
+              <a:buFont typeface="+mj-lt"/>
+              <a:buAutoNum type="arabicPeriod"/>
+            </a:pPr>
             <a:r>
               <a:rPr lang="en-US" dirty="0"/>
-              <a:t>Create new rails </a:t>
-            </a:r>
-            <a:r>
-              <a:rPr lang="en-US" dirty="0" smtClean="0"/>
-              <a:t>app</a:t>
-            </a:r>
-          </a:p>
-          <a:p>
-            <a:pPr marL="285750" indent="-285750">
-              <a:buFont typeface="Arial"/>
-              <a:buChar char="•"/>
-            </a:pPr>
-            <a:r>
-              <a:rPr lang="en-US" dirty="0" smtClean="0"/>
               <a:t>Edit </a:t>
             </a:r>
             <a:r>
-              <a:rPr lang="en-US" dirty="0" err="1" smtClean="0"/>
+              <a:rPr lang="en-US" dirty="0" err="1"/>
               <a:t>Gemfile</a:t>
             </a:r>
-            <a:endParaRPr lang="en-US" dirty="0" smtClean="0"/>
+            <a:endParaRPr lang="en-US" dirty="0"/>
           </a:p>
           <a:p>
             <a:pPr marL="1028700" lvl="1"/>
@@ -13420,86 +14524,64 @@
             </a:r>
             <a:r>
               <a:rPr lang="en-US" dirty="0"/>
-              <a:t>’</a:t>
-            </a:r>
-          </a:p>
-          <a:p>
-            <a:pPr marL="1428750" lvl="2"/>
+              <a:t>’ to Include the RhoConnect plugin </a:t>
+            </a:r>
+            <a:r>
+              <a:rPr lang="en-US" dirty="0" smtClean="0"/>
+              <a:t>gem.</a:t>
+            </a:r>
+            <a:endParaRPr lang="en-US" dirty="0"/>
+          </a:p>
+          <a:p>
+            <a:pPr marL="342900" indent="-342900">
+              <a:buFont typeface="+mj-lt"/>
+              <a:buAutoNum type="arabicPeriod"/>
+            </a:pPr>
             <a:r>
               <a:rPr lang="en-US" dirty="0"/>
-              <a:t>Include rhoconnect plugin </a:t>
+              <a:t>Add/Edit config/initializers/rhoconnect.rb</a:t>
+            </a:r>
+          </a:p>
+          <a:p>
+            <a:pPr marL="1028700" lvl="1"/>
+            <a:r>
+              <a:rPr lang="en-US" dirty="0"/>
+              <a:t>Add specific RhoConnect </a:t>
             </a:r>
             <a:r>
               <a:rPr lang="en-US" dirty="0" smtClean="0"/>
-              <a:t>gem</a:t>
-            </a:r>
-          </a:p>
-          <a:p>
-            <a:pPr marL="285750" indent="-285750">
-              <a:buFont typeface="Arial"/>
-              <a:buChar char="•"/>
+              <a:t>information.</a:t>
+            </a:r>
+            <a:endParaRPr lang="en-US" dirty="0"/>
+          </a:p>
+          <a:p>
+            <a:pPr marL="342900" indent="-342900">
+              <a:buFont typeface="+mj-lt"/>
+              <a:buAutoNum type="arabicPeriod"/>
             </a:pPr>
             <a:r>
+              <a:rPr lang="en-US" dirty="0"/>
+              <a:t>Add/Edit app/models/product.rb</a:t>
+            </a:r>
+          </a:p>
+          <a:p>
+            <a:pPr marL="1028700" lvl="1"/>
+            <a:r>
+              <a:rPr lang="en-US" dirty="0"/>
+              <a:t>Add actions for ‘partition’ and ‘</a:t>
+            </a:r>
+            <a:r>
+              <a:rPr lang="en-US" dirty="0" err="1"/>
+              <a:t>self.rhoconnect_query</a:t>
+            </a:r>
+            <a:r>
               <a:rPr lang="en-US" dirty="0" smtClean="0"/>
-              <a:t>Add/Edit </a:t>
-            </a:r>
-            <a:r>
-              <a:rPr lang="en-US" dirty="0" err="1" smtClean="0"/>
-              <a:t>config</a:t>
-            </a:r>
-            <a:r>
-              <a:rPr lang="en-US" dirty="0" smtClean="0"/>
-              <a:t>/initializers/</a:t>
-            </a:r>
-            <a:r>
-              <a:rPr lang="en-US" dirty="0" err="1" smtClean="0"/>
-              <a:t>rhoconnect.rb</a:t>
+              <a:t>’.</a:t>
             </a:r>
             <a:endParaRPr lang="en-US" dirty="0"/>
           </a:p>
           <a:p>
-            <a:pPr marL="1028700" lvl="1"/>
-            <a:r>
-              <a:rPr lang="en-US" dirty="0" smtClean="0"/>
-              <a:t>Add specific rhoconnect information</a:t>
-            </a:r>
-          </a:p>
-          <a:p>
-            <a:pPr marL="285750" indent="-285750">
-              <a:buFont typeface="Arial"/>
-              <a:buChar char="•"/>
-            </a:pPr>
-            <a:r>
-              <a:rPr lang="en-US" dirty="0" smtClean="0"/>
-              <a:t>Add/Edit app/models/</a:t>
-            </a:r>
-            <a:r>
-              <a:rPr lang="en-US" dirty="0" err="1" smtClean="0"/>
-              <a:t>product.rb</a:t>
-            </a:r>
-            <a:endParaRPr lang="en-US" dirty="0" smtClean="0"/>
-          </a:p>
-          <a:p>
-            <a:pPr marL="1028700" lvl="1"/>
-            <a:r>
-              <a:rPr lang="en-US" dirty="0" smtClean="0"/>
-              <a:t>Add actions for ‘partition’ and ‘</a:t>
-            </a:r>
-            <a:r>
-              <a:rPr lang="en-US" dirty="0" err="1" smtClean="0"/>
-              <a:t>self.rhoconnect_query</a:t>
-            </a:r>
-            <a:r>
-              <a:rPr lang="en-US" dirty="0" smtClean="0"/>
-              <a:t>’</a:t>
-            </a:r>
-            <a:endParaRPr lang="en-US" dirty="0"/>
-          </a:p>
-          <a:p>
-            <a:pPr marL="285750" indent="-285750">
-              <a:buFont typeface="Arial"/>
-              <a:buChar char="•"/>
-            </a:pPr>
+            <a:pPr marL="342900" indent="-342900"/>
             <a:endParaRPr lang="en-US" dirty="0" smtClean="0"/>
           </a:p>
         </p:txBody>
@@ -13507,13 +14589,20 @@
     </p:spTree>
     <p:extLst>
       <p:ext uri="{BB962C8B-B14F-4D97-AF65-F5344CB8AC3E}">
-        <p14:creationId xmlns:p14="http://schemas.microsoft.com/office/powerpoint/2010/main" val="2841819527"/>
+        <p14:creationId xmlns:p14="http://schemas.microsoft.com/office/powerpoint/2010/main" val="1014730717"/>
       </p:ext>
     </p:extLst>
   </p:cSld>
   <p:clrMapOvr>
     <a:masterClrMapping/>
   </p:clrMapOvr>
+  <p:timing>
+    <p:tnLst>
+      <p:par>
+        <p:cTn xmlns:p14="http://schemas.microsoft.com/office/powerpoint/2010/main" id="1" dur="indefinite" restart="never" nodeType="tmRoot"/>
+      </p:par>
+    </p:tnLst>
+  </p:timing>
 </p:sld>
 </file>
 
@@ -13594,19 +14683,7 @@
               <a:rPr lang="en-US" dirty="0" smtClean="0">
                 <a:latin typeface="Arial"/>
               </a:rPr>
-              <a:t>Michael </a:t>
-            </a:r>
-            <a:r>
-              <a:rPr lang="en-US" dirty="0" err="1" smtClean="0">
-                <a:latin typeface="Arial"/>
-              </a:rPr>
-              <a:t>Toews</a:t>
-            </a:r>
-            <a:r>
-              <a:rPr lang="en-US" dirty="0" smtClean="0">
-                <a:latin typeface="Arial"/>
-              </a:rPr>
-              <a:t>/Alex </a:t>
+              <a:t>Michael Toews/Alex </a:t>
             </a:r>
             <a:r>
               <a:rPr lang="en-US" dirty="0" err="1" smtClean="0">
@@ -13679,7 +14756,7 @@
           <a:lstStyle/>
           <a:p>
             <a:r>
-              <a:rPr lang="en-US" dirty="0" err="1" smtClean="0"/>
+              <a:rPr lang="en-US" dirty="0" smtClean="0"/>
               <a:t>StoreManager</a:t>
             </a:r>
             <a:endParaRPr lang="en-US" dirty="0"/>
@@ -13723,6 +14800,75 @@
 </file>
 
 <file path=ppt/slides/slide21.xml><?xml version="1.0" encoding="utf-8"?>
+<p:sld xmlns:a="http://schemas.openxmlformats.org/drawingml/2006/main" xmlns:r="http://schemas.openxmlformats.org/officeDocument/2006/relationships" xmlns:p="http://schemas.openxmlformats.org/presentationml/2006/main">
+  <p:cSld>
+    <p:spTree>
+      <p:nvGrpSpPr>
+        <p:cNvPr id="1" name=""/>
+        <p:cNvGrpSpPr/>
+        <p:nvPr/>
+      </p:nvGrpSpPr>
+      <p:grpSpPr>
+        <a:xfrm>
+          <a:off x="0" y="0"/>
+          <a:ext cx="0" cy="0"/>
+          <a:chOff x="0" y="0"/>
+          <a:chExt cx="0" cy="0"/>
+        </a:xfrm>
+      </p:grpSpPr>
+      <p:sp>
+        <p:nvSpPr>
+          <p:cNvPr id="2" name="Text Placeholder 1"/>
+          <p:cNvSpPr>
+            <a:spLocks noGrp="1"/>
+          </p:cNvSpPr>
+          <p:nvPr>
+            <p:ph type="body" sz="quarter" idx="10"/>
+          </p:nvPr>
+        </p:nvSpPr>
+        <p:spPr>
+          <a:xfrm>
+            <a:off x="276458" y="1119569"/>
+            <a:ext cx="8127828" cy="1687641"/>
+          </a:xfrm>
+        </p:spPr>
+        <p:txBody>
+          <a:bodyPr/>
+          <a:lstStyle/>
+          <a:p>
+            <a:r>
+              <a:rPr lang="en-US" dirty="0" smtClean="0"/>
+              <a:t>RHOCONNECT </a:t>
+            </a:r>
+            <a:r>
+              <a:rPr lang="en-US" dirty="0" smtClean="0"/>
+              <a:t>WITH PLUGINS DEMO </a:t>
+            </a:r>
+            <a:endParaRPr lang="en-US" dirty="0"/>
+          </a:p>
+        </p:txBody>
+      </p:sp>
+    </p:spTree>
+    <p:extLst>
+      <p:ext uri="{BB962C8B-B14F-4D97-AF65-F5344CB8AC3E}">
+        <p14:creationId xmlns:p14="http://schemas.microsoft.com/office/powerpoint/2010/main" val="755665567"/>
+      </p:ext>
+    </p:extLst>
+  </p:cSld>
+  <p:clrMapOvr>
+    <a:masterClrMapping/>
+  </p:clrMapOvr>
+  <p:timing>
+    <p:tnLst>
+      <p:par>
+        <p:cTn xmlns:p14="http://schemas.microsoft.com/office/powerpoint/2010/main" id="1" dur="indefinite" restart="never" nodeType="tmRoot"/>
+      </p:par>
+    </p:tnLst>
+  </p:timing>
+</p:sld>
+</file>
+
+<file path=ppt/slides/slide22.xml><?xml version="1.0" encoding="utf-8"?>
 <p:sld xmlns:a="http://schemas.openxmlformats.org/drawingml/2006/main" xmlns:r="http://schemas.openxmlformats.org/officeDocument/2006/relationships" xmlns:p="http://schemas.openxmlformats.org/presentationml/2006/main">
   <p:cSld>
     <p:spTree>
@@ -13770,7 +14916,7 @@
     </p:spTree>
     <p:extLst>
       <p:ext uri="{BB962C8B-B14F-4D97-AF65-F5344CB8AC3E}">
-        <p14:creationId xmlns:p14="http://schemas.microsoft.com/office/powerpoint/2010/main" val="241818773"/>
+        <p14:creationId xmlns:p14="http://schemas.microsoft.com/office/powerpoint/2010/main" val="492534516"/>
       </p:ext>
     </p:extLst>
   </p:cSld>
@@ -13814,7 +14960,7 @@
           <a:p>
             <a:r>
               <a:rPr lang="en-US" sz="4400" dirty="0" smtClean="0"/>
-              <a:t>INTRODUCTION</a:t>
+              <a:t>Problem</a:t>
             </a:r>
             <a:endParaRPr lang="en-US" sz="4400" dirty="0"/>
           </a:p>
@@ -13835,26 +14981,6 @@
           <a:bodyPr anchor="t"/>
           <a:lstStyle/>
           <a:p>
-            <a:pPr lvl="0">
-              <a:spcBef>
-                <a:spcPts val="0"/>
-              </a:spcBef>
-            </a:pPr>
-            <a:r>
-              <a:rPr lang="en" sz="1600" dirty="0">
-                <a:solidFill>
-                  <a:srgbClr val="FF0000"/>
-                </a:solidFill>
-              </a:rPr>
-              <a:t>Problem:</a:t>
-            </a:r>
-            <a:r>
-              <a:rPr lang="en" sz="1600" dirty="0"/>
-              <a:t> </a:t>
-            </a:r>
-            <a:endParaRPr lang="en-US" sz="1600" dirty="0" smtClean="0"/>
-          </a:p>
-          <a:p>
             <a:pPr marL="285750" lvl="0" indent="-285750">
               <a:spcBef>
                 <a:spcPts val="0"/>
@@ -13863,7 +14989,7 @@
               <a:buChar char="•"/>
             </a:pPr>
             <a:r>
-              <a:rPr lang="en-US" dirty="0"/>
+              <a:rPr lang="en-US" dirty="0" smtClean="0"/>
               <a:t>S</a:t>
             </a:r>
             <a:r>
@@ -14045,16 +15171,12 @@
           <a:lstStyle/>
           <a:p>
             <a:r>
+              <a:rPr lang="en-US" sz="4400" dirty="0" smtClean="0"/>
+              <a:t>Solution</a:t>
+            </a:r>
+            <a:r>
               <a:rPr lang="en-US" dirty="0" smtClean="0"/>
-              <a:t>INTRODUCTION (</a:t>
-            </a:r>
-            <a:r>
-              <a:rPr lang="en-US" dirty="0" err="1" smtClean="0"/>
-              <a:t>cont</a:t>
-            </a:r>
-            <a:r>
-              <a:rPr lang="en-US" dirty="0" smtClean="0"/>
-              <a:t>)</a:t>
+              <a:t>!</a:t>
             </a:r>
             <a:endParaRPr lang="en-US" dirty="0"/>
           </a:p>
@@ -14074,26 +15196,6 @@
         <p:txBody>
           <a:bodyPr/>
           <a:lstStyle/>
-          <a:p>
-            <a:pPr lvl="0">
-              <a:spcBef>
-                <a:spcPts val="0"/>
-              </a:spcBef>
-            </a:pPr>
-            <a:r>
-              <a:rPr lang="en" dirty="0">
-                <a:solidFill>
-                  <a:srgbClr val="0000FF"/>
-                </a:solidFill>
-              </a:rPr>
-              <a:t>Solution</a:t>
-            </a:r>
-            <a:r>
-              <a:rPr lang="en" dirty="0"/>
-              <a:t>: </a:t>
-            </a:r>
-            <a:endParaRPr lang="en-US" dirty="0" smtClean="0"/>
-          </a:p>
           <a:p>
             <a:pPr marL="285750" lvl="0" indent="-285750">
               <a:spcBef>
@@ -14284,10 +15386,10 @@
           <a:lstStyle/>
           <a:p>
             <a:r>
-              <a:rPr lang="en-US" dirty="0" smtClean="0"/>
-              <a:t>Visual</a:t>
-            </a:r>
-            <a:endParaRPr lang="en-US" dirty="0"/>
+              <a:rPr lang="en-US" sz="4400" dirty="0" smtClean="0"/>
+              <a:t>Architecture</a:t>
+            </a:r>
+            <a:endParaRPr lang="en-US" sz="4400" dirty="0"/>
           </a:p>
         </p:txBody>
       </p:sp>
@@ -14849,7 +15951,7 @@
         </p:nvSpPr>
         <p:spPr>
           <a:xfrm>
-            <a:off x="2475698" y="1600885"/>
+            <a:off x="2539168" y="1600885"/>
             <a:ext cx="2570999" cy="817799"/>
           </a:xfrm>
           <a:prstGeom prst="rect">
@@ -15197,16 +16299,19 @@
             </a:pPr>
             <a:r>
               <a:rPr lang="en-US" dirty="0" smtClean="0"/>
-              <a:t>Rhoconnect</a:t>
+              <a:t>RhoConnect</a:t>
             </a:r>
           </a:p>
           <a:p>
             <a:pPr marL="1028700" lvl="1"/>
             <a:r>
               <a:rPr lang="en-US" dirty="0" smtClean="0"/>
-              <a:t>Simple RhoConnect server application running on local machine</a:t>
-            </a:r>
-            <a:endParaRPr lang="en-US" dirty="0"/>
+              <a:t>Simple RhoConnect server application running on local </a:t>
+            </a:r>
+            <a:r>
+              <a:rPr lang="en-US" dirty="0" smtClean="0"/>
+              <a:t>machine</a:t>
+            </a:r>
           </a:p>
           <a:p>
             <a:pPr marL="285750" indent="-285750">
@@ -15214,16 +16319,21 @@
               <a:buChar char="•"/>
             </a:pPr>
             <a:r>
+              <a:rPr lang="en-US" dirty="0"/>
+              <a:t>RhoConnect without plugins in cloud</a:t>
+            </a:r>
+          </a:p>
+          <a:p>
+            <a:pPr marL="1028700" lvl="1"/>
+            <a:r>
+              <a:rPr lang="en-US" dirty="0"/>
+              <a:t>Same RhoConnect server as #1, but running in </a:t>
+            </a:r>
+            <a:r>
               <a:rPr lang="en-US" dirty="0" smtClean="0"/>
-              <a:t>Rhoconnect with plugins</a:t>
-            </a:r>
-          </a:p>
-          <a:p>
-            <a:pPr marL="1028700" lvl="1"/>
-            <a:r>
-              <a:rPr lang="en-US" dirty="0" smtClean="0"/>
-              <a:t>Vanilla RhoConnect server, with logic in rails plugin</a:t>
-            </a:r>
+              <a:t>cloud</a:t>
+            </a:r>
+            <a:endParaRPr lang="en-US" dirty="0"/>
           </a:p>
           <a:p>
             <a:pPr marL="285750" indent="-285750">
@@ -15232,16 +16342,20 @@
             </a:pPr>
             <a:r>
               <a:rPr lang="en-US" dirty="0" smtClean="0"/>
-              <a:t>Rhoconnect without plugins in cloud</a:t>
+              <a:t>RhoConnect with plugins</a:t>
             </a:r>
           </a:p>
           <a:p>
             <a:pPr marL="1028700" lvl="1"/>
             <a:r>
               <a:rPr lang="en-US" dirty="0" smtClean="0"/>
-              <a:t>Same RhoConnect server as #1, but running in cloud</a:t>
-            </a:r>
-            <a:endParaRPr lang="en-US" dirty="0"/>
+              <a:t>Vanilla RhoConnect server, with logic in rails </a:t>
+            </a:r>
+            <a:r>
+              <a:rPr lang="en-US" dirty="0" smtClean="0"/>
+              <a:t>plugin</a:t>
+            </a:r>
+            <a:endParaRPr lang="en-US" dirty="0" smtClean="0"/>
           </a:p>
         </p:txBody>
       </p:sp>
@@ -15409,6 +16523,13 @@
             <a:r>
               <a:rPr lang="en-US" dirty="0" smtClean="0"/>
               <a:t>‘cd rhoconnect-server’</a:t>
+            </a:r>
+          </a:p>
+          <a:p>
+            <a:pPr marL="1085850" lvl="1" indent="-342900"/>
+            <a:r>
+              <a:rPr lang="en-US" dirty="0" smtClean="0"/>
+              <a:t>Change directory into the app’s dir.</a:t>
             </a:r>
           </a:p>
           <a:p>

</xml_diff>

<commit_message>
updated plugin ppt section
</commit_message>
<xml_diff>
--- a/Rhoconnect-appforum.pptx
+++ b/Rhoconnect-appforum.pptx
@@ -5,10 +5,10 @@
     <p:sldMasterId id="2147493455" r:id="rId4"/>
   </p:sldMasterIdLst>
   <p:notesMasterIdLst>
-    <p:notesMasterId r:id="rId27"/>
+    <p:notesMasterId r:id="rId25"/>
   </p:notesMasterIdLst>
   <p:handoutMasterIdLst>
-    <p:handoutMasterId r:id="rId28"/>
+    <p:handoutMasterId r:id="rId26"/>
   </p:handoutMasterIdLst>
   <p:sldIdLst>
     <p:sldId id="256" r:id="rId5"/>
@@ -29,10 +29,8 @@
     <p:sldId id="291" r:id="rId20"/>
     <p:sldId id="298" r:id="rId21"/>
     <p:sldId id="292" r:id="rId22"/>
-    <p:sldId id="286" r:id="rId23"/>
-    <p:sldId id="287" r:id="rId24"/>
-    <p:sldId id="297" r:id="rId25"/>
-    <p:sldId id="296" r:id="rId26"/>
+    <p:sldId id="287" r:id="rId23"/>
+    <p:sldId id="296" r:id="rId24"/>
   </p:sldIdLst>
   <p:sldSz cx="9144000" cy="5143500" type="screen16x9"/>
   <p:notesSz cx="6858000" cy="9144000"/>
@@ -217,7 +215,7 @@
             <a:fld id="{03226B35-E884-5E4D-87DA-A7EDD87DC00C}" type="datetimeFigureOut">
               <a:rPr lang="en-US" smtClean="0"/>
               <a:pPr/>
-              <a:t>09/2/14</a:t>
+              <a:t>9/3/14</a:t>
             </a:fld>
             <a:endParaRPr lang="en-US"/>
           </a:p>
@@ -384,7 +382,7 @@
             <a:fld id="{6D788B50-DD5C-5F41-9B32-973BBF99E849}" type="datetimeFigureOut">
               <a:rPr lang="en-US" smtClean="0"/>
               <a:pPr/>
-              <a:t>09/2/14</a:t>
+              <a:t>9/3/14</a:t>
             </a:fld>
             <a:endParaRPr lang="en-US"/>
           </a:p>
@@ -1330,35 +1328,11 @@
           <a:p>
             <a:r>
               <a:rPr lang="en-US" dirty="0" smtClean="0"/>
-              <a:t>First we’ll need to create a vanilla</a:t>
+              <a:t>As far as our client app is concerned, nothing needs to be changed</a:t>
             </a:r>
             <a:r>
               <a:rPr lang="en-US" baseline="0" dirty="0" smtClean="0"/>
-              <a:t> RhoConnect app and a new rails app to work with. Once they are both created, we need to add the parts that will allow us to connect the two: add the ‘rhoconnect-</a:t>
-            </a:r>
-            <a:r>
-              <a:rPr lang="en-US" baseline="0" dirty="0" err="1" smtClean="0"/>
-              <a:t>rb</a:t>
-            </a:r>
-            <a:r>
-              <a:rPr lang="en-US" baseline="0" dirty="0" smtClean="0"/>
-              <a:t> gem into the </a:t>
-            </a:r>
-            <a:r>
-              <a:rPr lang="en-US" baseline="0" dirty="0" err="1" smtClean="0"/>
-              <a:t>Gemfile</a:t>
-            </a:r>
-            <a:r>
-              <a:rPr lang="en-US" baseline="0" dirty="0" smtClean="0"/>
-              <a:t>, setup RhoConnect as we usually would with the config, initializers etc., and edit our models to add actions to their </a:t>
-            </a:r>
-            <a:r>
-              <a:rPr lang="en-US" baseline="0" dirty="0" err="1" smtClean="0"/>
-              <a:t>rhoconnect_query</a:t>
-            </a:r>
-            <a:r>
-              <a:rPr lang="en-US" baseline="0" dirty="0" smtClean="0"/>
-              <a:t> method.</a:t>
+              <a:t> in order for it to work with RhoConnect w/ plugins.</a:t>
             </a:r>
             <a:endParaRPr lang="en-US" dirty="0"/>
           </a:p>
@@ -1391,7 +1365,7 @@
     </p:spTree>
     <p:extLst>
       <p:ext uri="{BB962C8B-B14F-4D97-AF65-F5344CB8AC3E}">
-        <p14:creationId xmlns:p14="http://schemas.microsoft.com/office/powerpoint/2010/main" val="3606908596"/>
+        <p14:creationId xmlns:p14="http://schemas.microsoft.com/office/powerpoint/2010/main" val="2760172637"/>
       </p:ext>
     </p:extLst>
   </p:cSld>
@@ -1445,15 +1419,7 @@
           <a:bodyPr/>
           <a:lstStyle/>
           <a:p>
-            <a:r>
-              <a:rPr lang="en-US" dirty="0" smtClean="0"/>
-              <a:t>As far as our client app is concerned, nothing needs to be changed</a:t>
-            </a:r>
-            <a:r>
-              <a:rPr lang="en-US" baseline="0" dirty="0" smtClean="0"/>
-              <a:t> in order for it to work with RhoConnect w/ plugins.</a:t>
-            </a:r>
-            <a:endParaRPr lang="en-US" dirty="0"/>
+            <a:endParaRPr lang="en-US"/>
           </a:p>
         </p:txBody>
       </p:sp>
@@ -1476,176 +1442,6 @@
               <a:rPr lang="en-US" smtClean="0"/>
               <a:pPr/>
               <a:t>20</a:t>
-            </a:fld>
-            <a:endParaRPr lang="en-US"/>
-          </a:p>
-        </p:txBody>
-      </p:sp>
-    </p:spTree>
-    <p:extLst>
-      <p:ext uri="{BB962C8B-B14F-4D97-AF65-F5344CB8AC3E}">
-        <p14:creationId xmlns:p14="http://schemas.microsoft.com/office/powerpoint/2010/main" val="2760172637"/>
-      </p:ext>
-    </p:extLst>
-  </p:cSld>
-  <p:clrMapOvr>
-    <a:masterClrMapping/>
-  </p:clrMapOvr>
-</p:notes>
-</file>
-
-<file path=ppt/notesSlides/notesSlide17.xml><?xml version="1.0" encoding="utf-8"?>
-<p:notes xmlns:a="http://schemas.openxmlformats.org/drawingml/2006/main" xmlns:r="http://schemas.openxmlformats.org/officeDocument/2006/relationships" xmlns:p="http://schemas.openxmlformats.org/presentationml/2006/main">
-  <p:cSld>
-    <p:spTree>
-      <p:nvGrpSpPr>
-        <p:cNvPr id="1" name=""/>
-        <p:cNvGrpSpPr/>
-        <p:nvPr/>
-      </p:nvGrpSpPr>
-      <p:grpSpPr>
-        <a:xfrm>
-          <a:off x="0" y="0"/>
-          <a:ext cx="0" cy="0"/>
-          <a:chOff x="0" y="0"/>
-          <a:chExt cx="0" cy="0"/>
-        </a:xfrm>
-      </p:grpSpPr>
-      <p:sp>
-        <p:nvSpPr>
-          <p:cNvPr id="2" name="Slide Image Placeholder 1"/>
-          <p:cNvSpPr>
-            <a:spLocks noGrp="1" noRot="1" noChangeAspect="1"/>
-          </p:cNvSpPr>
-          <p:nvPr>
-            <p:ph type="sldImg"/>
-          </p:nvPr>
-        </p:nvSpPr>
-        <p:spPr/>
-      </p:sp>
-      <p:sp>
-        <p:nvSpPr>
-          <p:cNvPr id="3" name="Notes Placeholder 2"/>
-          <p:cNvSpPr>
-            <a:spLocks noGrp="1"/>
-          </p:cNvSpPr>
-          <p:nvPr>
-            <p:ph type="body" idx="1"/>
-          </p:nvPr>
-        </p:nvSpPr>
-        <p:spPr/>
-        <p:txBody>
-          <a:bodyPr/>
-          <a:lstStyle/>
-          <a:p>
-            <a:endParaRPr lang="en-US" dirty="0"/>
-          </a:p>
-        </p:txBody>
-      </p:sp>
-      <p:sp>
-        <p:nvSpPr>
-          <p:cNvPr id="4" name="Slide Number Placeholder 3"/>
-          <p:cNvSpPr>
-            <a:spLocks noGrp="1"/>
-          </p:cNvSpPr>
-          <p:nvPr>
-            <p:ph type="sldNum" sz="quarter" idx="10"/>
-          </p:nvPr>
-        </p:nvSpPr>
-        <p:spPr/>
-        <p:txBody>
-          <a:bodyPr/>
-          <a:lstStyle/>
-          <a:p>
-            <a:fld id="{D77A3FF8-68AA-A041-ADA3-194758FF0D5D}" type="slidenum">
-              <a:rPr lang="en-US" smtClean="0"/>
-              <a:pPr/>
-              <a:t>21</a:t>
-            </a:fld>
-            <a:endParaRPr lang="en-US"/>
-          </a:p>
-        </p:txBody>
-      </p:sp>
-    </p:spTree>
-    <p:extLst>
-      <p:ext uri="{BB962C8B-B14F-4D97-AF65-F5344CB8AC3E}">
-        <p14:creationId xmlns:p14="http://schemas.microsoft.com/office/powerpoint/2010/main" val="1147205294"/>
-      </p:ext>
-    </p:extLst>
-  </p:cSld>
-  <p:clrMapOvr>
-    <a:masterClrMapping/>
-  </p:clrMapOvr>
-</p:notes>
-</file>
-
-<file path=ppt/notesSlides/notesSlide18.xml><?xml version="1.0" encoding="utf-8"?>
-<p:notes xmlns:a="http://schemas.openxmlformats.org/drawingml/2006/main" xmlns:r="http://schemas.openxmlformats.org/officeDocument/2006/relationships" xmlns:p="http://schemas.openxmlformats.org/presentationml/2006/main">
-  <p:cSld>
-    <p:spTree>
-      <p:nvGrpSpPr>
-        <p:cNvPr id="1" name=""/>
-        <p:cNvGrpSpPr/>
-        <p:nvPr/>
-      </p:nvGrpSpPr>
-      <p:grpSpPr>
-        <a:xfrm>
-          <a:off x="0" y="0"/>
-          <a:ext cx="0" cy="0"/>
-          <a:chOff x="0" y="0"/>
-          <a:chExt cx="0" cy="0"/>
-        </a:xfrm>
-      </p:grpSpPr>
-      <p:sp>
-        <p:nvSpPr>
-          <p:cNvPr id="2" name="Slide Image Placeholder 1"/>
-          <p:cNvSpPr>
-            <a:spLocks noGrp="1" noRot="1" noChangeAspect="1"/>
-          </p:cNvSpPr>
-          <p:nvPr>
-            <p:ph type="sldImg"/>
-          </p:nvPr>
-        </p:nvSpPr>
-        <p:spPr/>
-      </p:sp>
-      <p:sp>
-        <p:nvSpPr>
-          <p:cNvPr id="3" name="Notes Placeholder 2"/>
-          <p:cNvSpPr>
-            <a:spLocks noGrp="1"/>
-          </p:cNvSpPr>
-          <p:nvPr>
-            <p:ph type="body" idx="1"/>
-          </p:nvPr>
-        </p:nvSpPr>
-        <p:spPr/>
-        <p:txBody>
-          <a:bodyPr/>
-          <a:lstStyle/>
-          <a:p>
-            <a:endParaRPr lang="en-US"/>
-          </a:p>
-        </p:txBody>
-      </p:sp>
-      <p:sp>
-        <p:nvSpPr>
-          <p:cNvPr id="4" name="Slide Number Placeholder 3"/>
-          <p:cNvSpPr>
-            <a:spLocks noGrp="1"/>
-          </p:cNvSpPr>
-          <p:nvPr>
-            <p:ph type="sldNum" sz="quarter" idx="10"/>
-          </p:nvPr>
-        </p:nvSpPr>
-        <p:spPr/>
-        <p:txBody>
-          <a:bodyPr/>
-          <a:lstStyle/>
-          <a:p>
-            <a:fld id="{D77A3FF8-68AA-A041-ADA3-194758FF0D5D}" type="slidenum">
-              <a:rPr lang="en-US" smtClean="0"/>
-              <a:pPr/>
-              <a:t>22</a:t>
             </a:fld>
             <a:endParaRPr lang="en-US"/>
           </a:p>
@@ -2049,13 +1845,8 @@
             </a:r>
             <a:r>
               <a:rPr lang="en-US" baseline="0" dirty="0" smtClean="0"/>
-              <a:t> server for </a:t>
-            </a:r>
-            <a:r>
-              <a:rPr lang="en-US" baseline="0" dirty="0" smtClean="0"/>
-              <a:t>diffs on each model that has a source adapter for it.</a:t>
-            </a:r>
-            <a:endParaRPr lang="en-US" baseline="0" dirty="0" smtClean="0"/>
+              <a:t> server for diffs on each model that has a source adapter for it.</a:t>
+            </a:r>
           </a:p>
           <a:p>
             <a:r>
@@ -13825,11 +13616,7 @@
           <a:p>
             <a:r>
               <a:rPr lang="en-US" dirty="0" smtClean="0"/>
-              <a:t>RhoConnect - </a:t>
-            </a:r>
-            <a:r>
-              <a:rPr lang="en-US" dirty="0" smtClean="0"/>
-              <a:t>Cloud</a:t>
+              <a:t>RhoConnect - Cloud</a:t>
             </a:r>
             <a:endParaRPr lang="en-US" dirty="0"/>
           </a:p>
@@ -14018,11 +13805,7 @@
           <a:p>
             <a:r>
               <a:rPr lang="en-US" dirty="0" smtClean="0"/>
-              <a:t>StoreManager - </a:t>
-            </a:r>
-            <a:r>
-              <a:rPr lang="en-US" dirty="0" smtClean="0"/>
-              <a:t>Cloud</a:t>
+              <a:t>StoreManager - Cloud</a:t>
             </a:r>
             <a:endParaRPr lang="en-US" dirty="0"/>
           </a:p>
@@ -14064,23 +13847,7 @@
             <a:pPr marL="1085850" lvl="1" indent="-342900"/>
             <a:r>
               <a:rPr lang="en-US" dirty="0" smtClean="0"/>
-              <a:t>syncserver </a:t>
-            </a:r>
-            <a:r>
-              <a:rPr lang="en-US" dirty="0" smtClean="0"/>
-              <a:t>= </a:t>
-            </a:r>
-            <a:r>
-              <a:rPr lang="en-US" dirty="0" smtClean="0"/>
-              <a:t>“</a:t>
-            </a:r>
-            <a:r>
-              <a:rPr lang="en-US" dirty="0" smtClean="0"/>
-              <a:t>&lt;</a:t>
-            </a:r>
-            <a:r>
-              <a:rPr lang="en-US" dirty="0" smtClean="0"/>
-              <a:t>your-backend&gt;”</a:t>
+              <a:t>syncserver = “&lt;your-backend&gt;”</a:t>
             </a:r>
             <a:endParaRPr lang="en-US" dirty="0"/>
           </a:p>
@@ -14111,19 +13878,7 @@
             </a:r>
             <a:r>
               <a:rPr lang="en-US" dirty="0" smtClean="0"/>
-              <a:t>R</a:t>
-            </a:r>
-            <a:r>
-              <a:rPr lang="en-US" dirty="0" smtClean="0"/>
-              <a:t>hoMobile </a:t>
-            </a:r>
-            <a:r>
-              <a:rPr lang="en-US" dirty="0" smtClean="0"/>
-              <a:t>R</a:t>
-            </a:r>
-            <a:r>
-              <a:rPr lang="en-US" dirty="0" smtClean="0"/>
-              <a:t>hoConnect app</a:t>
+              <a:t>RhoMobile RhoConnect app</a:t>
             </a:r>
             <a:endParaRPr lang="en-US" dirty="0"/>
           </a:p>
@@ -14213,11 +13968,7 @@
             </a:pPr>
             <a:r>
               <a:rPr lang="en-US" dirty="0" smtClean="0"/>
-              <a:t>Download </a:t>
-            </a:r>
-            <a:r>
-              <a:rPr lang="en-US" dirty="0" smtClean="0"/>
-              <a:t>to device</a:t>
+              <a:t>Download to device</a:t>
             </a:r>
             <a:endParaRPr lang="en-US" dirty="0"/>
           </a:p>
@@ -14278,11 +14029,7 @@
           <a:p>
             <a:r>
               <a:rPr lang="en-US" dirty="0" smtClean="0"/>
-              <a:t>RHOCONNECT </a:t>
-            </a:r>
-            <a:r>
-              <a:rPr lang="en-US" dirty="0" smtClean="0"/>
-              <a:t>CLOUD DEMO </a:t>
+              <a:t>RHOCONNECT CLOUD DEMO </a:t>
             </a:r>
             <a:endParaRPr lang="en-US" dirty="0"/>
           </a:p>
@@ -14400,7 +14147,7 @@
           <a:p>
             <a:r>
               <a:rPr lang="en-US" dirty="0" smtClean="0"/>
-              <a:t>RhoConnect and Rails Apps</a:t>
+              <a:t>RhoConnect with plugin</a:t>
             </a:r>
             <a:endParaRPr lang="en-US" dirty="0"/>
           </a:p>
@@ -14421,193 +14168,102 @@
           <a:bodyPr/>
           <a:lstStyle/>
           <a:p>
-            <a:pPr marL="342900" indent="-342900">
-              <a:buFont typeface="+mj-lt"/>
-              <a:buAutoNum type="arabicPeriod"/>
+            <a:pPr marL="285750" indent="-285750">
+              <a:buFont typeface="Arial"/>
+              <a:buChar char="•"/>
             </a:pPr>
             <a:r>
               <a:rPr lang="en-US" dirty="0" smtClean="0"/>
-              <a:t>‘rhoconnect app rhoconnect-vanilla’</a:t>
-            </a:r>
-          </a:p>
-          <a:p>
-            <a:pPr marL="1085850" lvl="1" indent="-342900"/>
+              <a:t>Allows developers to connect their backend apps to RhoConnect.</a:t>
+            </a:r>
+          </a:p>
+          <a:p>
+            <a:pPr marL="285750" indent="-285750">
+              <a:buFont typeface="Arial"/>
+              <a:buChar char="•"/>
+            </a:pPr>
             <a:r>
               <a:rPr lang="en-US" dirty="0" smtClean="0"/>
-              <a:t>Create purely vanilla rhoconnect </a:t>
-            </a:r>
+              <a:t>Quickly add syncing engine to your applications</a:t>
+            </a:r>
+            <a:endParaRPr lang="en-US" dirty="0" smtClean="0"/>
+          </a:p>
+          <a:p>
+            <a:pPr marL="285750" indent="-285750">
+              <a:buFont typeface="Arial"/>
+              <a:buChar char="•"/>
+            </a:pPr>
             <a:r>
               <a:rPr lang="en-US" dirty="0" smtClean="0"/>
-              <a:t>application.</a:t>
-            </a:r>
+              <a:t>Supports Java, .NET, Ruby-on-Rails</a:t>
+            </a:r>
+          </a:p>
+          <a:p>
+            <a:pPr marL="285750" indent="-285750">
+              <a:buFont typeface="Arial"/>
+              <a:buChar char="•"/>
+            </a:pPr>
+            <a:r>
+              <a:rPr lang="en-US" dirty="0" smtClean="0"/>
+              <a:t>For more information</a:t>
+            </a:r>
+            <a:r>
+              <a:rPr lang="en-US" dirty="0"/>
+              <a:t>, </a:t>
+            </a:r>
+            <a:r>
+              <a:rPr lang="en-US" dirty="0" smtClean="0"/>
+              <a:t>visit</a:t>
+            </a:r>
+          </a:p>
+          <a:p>
+            <a:pPr marL="285750" indent="-285750">
+              <a:buFont typeface="Arial"/>
+              <a:buChar char="•"/>
+            </a:pPr>
+            <a:r>
+              <a:rPr lang="en-US" dirty="0" smtClean="0"/>
+              <a:t> </a:t>
+            </a:r>
+            <a:r>
+              <a:rPr lang="en-US" dirty="0">
+                <a:hlinkClick r:id="rId3"/>
+              </a:rPr>
+              <a:t>http://docs.rhomobile.com/en/5.0.0/rhoconnect/plugin</a:t>
+            </a:r>
+            <a:r>
+              <a:rPr lang="en-US">
+                <a:hlinkClick r:id="rId3"/>
+              </a:rPr>
+              <a:t>-</a:t>
+            </a:r>
+            <a:r>
+              <a:rPr lang="en-US" smtClean="0">
+                <a:hlinkClick r:id="rId3"/>
+              </a:rPr>
+              <a:t>intro</a:t>
+            </a:r>
+            <a:endParaRPr lang="en-US" smtClean="0"/>
+          </a:p>
+          <a:p>
+            <a:pPr marL="285750" indent="-285750">
+              <a:buFont typeface="Arial"/>
+              <a:buChar char="•"/>
+            </a:pPr>
             <a:endParaRPr lang="en-US" dirty="0"/>
-          </a:p>
-          <a:p>
-            <a:pPr marL="1085850" lvl="1" indent="-342900"/>
-            <a:r>
-              <a:rPr lang="en-US" dirty="0" smtClean="0"/>
-              <a:t>Optionally </a:t>
-            </a:r>
-            <a:r>
-              <a:rPr lang="en-US" dirty="0" smtClean="0"/>
-              <a:t>just start rhoconnect anonymous </a:t>
-            </a:r>
-            <a:r>
-              <a:rPr lang="en-US" dirty="0" smtClean="0"/>
-              <a:t>server.</a:t>
-            </a:r>
-          </a:p>
-          <a:p>
-            <a:pPr marL="1485900" lvl="2" indent="-342900"/>
-            <a:r>
-              <a:rPr lang="en-US" dirty="0" smtClean="0"/>
-              <a:t>‘rhoconnect </a:t>
-            </a:r>
-            <a:r>
-              <a:rPr lang="en-US" dirty="0" smtClean="0"/>
-              <a:t>start</a:t>
-            </a:r>
-            <a:r>
-              <a:rPr lang="en-US" dirty="0" smtClean="0"/>
-              <a:t>’</a:t>
-            </a:r>
-          </a:p>
-          <a:p>
-            <a:pPr marL="342900" indent="-342900">
-              <a:buFont typeface="+mj-lt"/>
-              <a:buAutoNum type="arabicPeriod"/>
-            </a:pPr>
-            <a:r>
-              <a:rPr lang="en-US" dirty="0"/>
-              <a:t>‘rails new </a:t>
-            </a:r>
-            <a:r>
-              <a:rPr lang="en-US" dirty="0" err="1"/>
-              <a:t>rhostore</a:t>
-            </a:r>
-            <a:r>
-              <a:rPr lang="en-US" dirty="0"/>
-              <a:t>-with-plugin’</a:t>
-            </a:r>
-          </a:p>
-          <a:p>
-            <a:pPr marL="1028700" lvl="1"/>
-            <a:r>
-              <a:rPr lang="en-US" dirty="0"/>
-              <a:t>Create a new rails </a:t>
-            </a:r>
-            <a:r>
-              <a:rPr lang="en-US" dirty="0" smtClean="0"/>
-              <a:t>app.</a:t>
-            </a:r>
-            <a:endParaRPr lang="en-US" dirty="0"/>
-          </a:p>
-          <a:p>
-            <a:pPr marL="342900" indent="-342900">
-              <a:buFont typeface="+mj-lt"/>
-              <a:buAutoNum type="arabicPeriod"/>
-            </a:pPr>
-            <a:r>
-              <a:rPr lang="en-US" dirty="0"/>
-              <a:t>Edit </a:t>
-            </a:r>
-            <a:r>
-              <a:rPr lang="en-US" dirty="0" err="1"/>
-              <a:t>Gemfile</a:t>
-            </a:r>
-            <a:endParaRPr lang="en-US" dirty="0"/>
-          </a:p>
-          <a:p>
-            <a:pPr marL="1028700" lvl="1"/>
-            <a:r>
-              <a:rPr lang="en-US" dirty="0"/>
-              <a:t>Add/Edit ‘rhoconnect-</a:t>
-            </a:r>
-            <a:r>
-              <a:rPr lang="en-US" dirty="0" err="1"/>
-              <a:t>rb</a:t>
-            </a:r>
-            <a:r>
-              <a:rPr lang="en-US" dirty="0"/>
-              <a:t>’ to Include the RhoConnect plugin </a:t>
-            </a:r>
-            <a:r>
-              <a:rPr lang="en-US" dirty="0" smtClean="0"/>
-              <a:t>gem.</a:t>
-            </a:r>
-            <a:endParaRPr lang="en-US" dirty="0"/>
-          </a:p>
-          <a:p>
-            <a:pPr marL="342900" indent="-342900">
-              <a:buFont typeface="+mj-lt"/>
-              <a:buAutoNum type="arabicPeriod"/>
-            </a:pPr>
-            <a:r>
-              <a:rPr lang="en-US" dirty="0"/>
-              <a:t>Add/Edit config/initializers/rhoconnect.rb</a:t>
-            </a:r>
-          </a:p>
-          <a:p>
-            <a:pPr marL="1028700" lvl="1"/>
-            <a:r>
-              <a:rPr lang="en-US" dirty="0"/>
-              <a:t>Add specific RhoConnect </a:t>
-            </a:r>
-            <a:r>
-              <a:rPr lang="en-US" dirty="0" smtClean="0"/>
-              <a:t>information.</a:t>
-            </a:r>
-            <a:endParaRPr lang="en-US" dirty="0"/>
-          </a:p>
-          <a:p>
-            <a:pPr marL="342900" indent="-342900">
-              <a:buFont typeface="+mj-lt"/>
-              <a:buAutoNum type="arabicPeriod"/>
-            </a:pPr>
-            <a:r>
-              <a:rPr lang="en-US" dirty="0"/>
-              <a:t>Add/Edit app/models/product.rb</a:t>
-            </a:r>
-          </a:p>
-          <a:p>
-            <a:pPr marL="1028700" lvl="1"/>
-            <a:r>
-              <a:rPr lang="en-US" dirty="0"/>
-              <a:t>Add actions for ‘partition’ and ‘</a:t>
-            </a:r>
-            <a:r>
-              <a:rPr lang="en-US" dirty="0" err="1"/>
-              <a:t>self.rhoconnect_query</a:t>
-            </a:r>
-            <a:r>
-              <a:rPr lang="en-US" dirty="0" smtClean="0"/>
-              <a:t>’.</a:t>
-            </a:r>
-            <a:endParaRPr lang="en-US" dirty="0"/>
-          </a:p>
-          <a:p>
-            <a:pPr marL="342900" indent="-342900"/>
-            <a:endParaRPr lang="en-US" dirty="0" smtClean="0"/>
           </a:p>
         </p:txBody>
       </p:sp>
     </p:spTree>
     <p:extLst>
       <p:ext uri="{BB962C8B-B14F-4D97-AF65-F5344CB8AC3E}">
-        <p14:creationId xmlns:p14="http://schemas.microsoft.com/office/powerpoint/2010/main" val="1014730717"/>
+        <p14:creationId xmlns:p14="http://schemas.microsoft.com/office/powerpoint/2010/main" val="2747107580"/>
       </p:ext>
     </p:extLst>
   </p:cSld>
   <p:clrMapOvr>
     <a:masterClrMapping/>
   </p:clrMapOvr>
-  <p:timing>
-    <p:tnLst>
-      <p:par>
-        <p:cTn xmlns:p14="http://schemas.microsoft.com/office/powerpoint/2010/main" id="1" dur="indefinite" restart="never" nodeType="tmRoot"/>
-      </p:par>
-    </p:tnLst>
-  </p:timing>
 </p:sld>
 </file>
 
@@ -14729,151 +14385,6 @@
 </file>
 
 <file path=ppt/slides/slide20.xml><?xml version="1.0" encoding="utf-8"?>
-<p:sld xmlns:a="http://schemas.openxmlformats.org/drawingml/2006/main" xmlns:r="http://schemas.openxmlformats.org/officeDocument/2006/relationships" xmlns:p="http://schemas.openxmlformats.org/presentationml/2006/main">
-  <p:cSld>
-    <p:spTree>
-      <p:nvGrpSpPr>
-        <p:cNvPr id="1" name=""/>
-        <p:cNvGrpSpPr/>
-        <p:nvPr/>
-      </p:nvGrpSpPr>
-      <p:grpSpPr>
-        <a:xfrm>
-          <a:off x="0" y="0"/>
-          <a:ext cx="0" cy="0"/>
-          <a:chOff x="0" y="0"/>
-          <a:chExt cx="0" cy="0"/>
-        </a:xfrm>
-      </p:grpSpPr>
-      <p:sp>
-        <p:nvSpPr>
-          <p:cNvPr id="2" name="Title 1"/>
-          <p:cNvSpPr>
-            <a:spLocks noGrp="1"/>
-          </p:cNvSpPr>
-          <p:nvPr>
-            <p:ph type="title"/>
-          </p:nvPr>
-        </p:nvSpPr>
-        <p:spPr/>
-        <p:txBody>
-          <a:bodyPr/>
-          <a:lstStyle/>
-          <a:p>
-            <a:r>
-              <a:rPr lang="en-US" dirty="0" smtClean="0"/>
-              <a:t>StoreManager</a:t>
-            </a:r>
-            <a:endParaRPr lang="en-US" dirty="0"/>
-          </a:p>
-        </p:txBody>
-      </p:sp>
-      <p:sp>
-        <p:nvSpPr>
-          <p:cNvPr id="3" name="Content Placeholder 2"/>
-          <p:cNvSpPr>
-            <a:spLocks noGrp="1"/>
-          </p:cNvSpPr>
-          <p:nvPr>
-            <p:ph idx="1"/>
-          </p:nvPr>
-        </p:nvSpPr>
-        <p:spPr/>
-        <p:txBody>
-          <a:bodyPr/>
-          <a:lstStyle/>
-          <a:p>
-            <a:r>
-              <a:rPr lang="en-US" dirty="0" smtClean="0"/>
-              <a:t>No changes!</a:t>
-            </a:r>
-            <a:endParaRPr lang="en-US" dirty="0"/>
-          </a:p>
-        </p:txBody>
-      </p:sp>
-    </p:spTree>
-    <p:extLst>
-      <p:ext uri="{BB962C8B-B14F-4D97-AF65-F5344CB8AC3E}">
-        <p14:creationId xmlns:p14="http://schemas.microsoft.com/office/powerpoint/2010/main" val="2747107580"/>
-      </p:ext>
-    </p:extLst>
-  </p:cSld>
-  <p:clrMapOvr>
-    <a:masterClrMapping/>
-  </p:clrMapOvr>
-</p:sld>
-</file>
-
-<file path=ppt/slides/slide21.xml><?xml version="1.0" encoding="utf-8"?>
-<p:sld xmlns:a="http://schemas.openxmlformats.org/drawingml/2006/main" xmlns:r="http://schemas.openxmlformats.org/officeDocument/2006/relationships" xmlns:p="http://schemas.openxmlformats.org/presentationml/2006/main">
-  <p:cSld>
-    <p:spTree>
-      <p:nvGrpSpPr>
-        <p:cNvPr id="1" name=""/>
-        <p:cNvGrpSpPr/>
-        <p:nvPr/>
-      </p:nvGrpSpPr>
-      <p:grpSpPr>
-        <a:xfrm>
-          <a:off x="0" y="0"/>
-          <a:ext cx="0" cy="0"/>
-          <a:chOff x="0" y="0"/>
-          <a:chExt cx="0" cy="0"/>
-        </a:xfrm>
-      </p:grpSpPr>
-      <p:sp>
-        <p:nvSpPr>
-          <p:cNvPr id="2" name="Text Placeholder 1"/>
-          <p:cNvSpPr>
-            <a:spLocks noGrp="1"/>
-          </p:cNvSpPr>
-          <p:nvPr>
-            <p:ph type="body" sz="quarter" idx="10"/>
-          </p:nvPr>
-        </p:nvSpPr>
-        <p:spPr>
-          <a:xfrm>
-            <a:off x="276458" y="1119569"/>
-            <a:ext cx="8127828" cy="1687641"/>
-          </a:xfrm>
-        </p:spPr>
-        <p:txBody>
-          <a:bodyPr/>
-          <a:lstStyle/>
-          <a:p>
-            <a:r>
-              <a:rPr lang="en-US" dirty="0" smtClean="0"/>
-              <a:t>RHOCONNECT </a:t>
-            </a:r>
-            <a:r>
-              <a:rPr lang="en-US" dirty="0" smtClean="0"/>
-              <a:t>WITH PLUGINS DEMO </a:t>
-            </a:r>
-            <a:endParaRPr lang="en-US" dirty="0"/>
-          </a:p>
-        </p:txBody>
-      </p:sp>
-    </p:spTree>
-    <p:extLst>
-      <p:ext uri="{BB962C8B-B14F-4D97-AF65-F5344CB8AC3E}">
-        <p14:creationId xmlns:p14="http://schemas.microsoft.com/office/powerpoint/2010/main" val="755665567"/>
-      </p:ext>
-    </p:extLst>
-  </p:cSld>
-  <p:clrMapOvr>
-    <a:masterClrMapping/>
-  </p:clrMapOvr>
-  <p:timing>
-    <p:tnLst>
-      <p:par>
-        <p:cTn xmlns:p14="http://schemas.microsoft.com/office/powerpoint/2010/main" id="1" dur="indefinite" restart="never" nodeType="tmRoot"/>
-      </p:par>
-    </p:tnLst>
-  </p:timing>
-</p:sld>
-</file>
-
-<file path=ppt/slides/slide22.xml><?xml version="1.0" encoding="utf-8"?>
 <p:sld xmlns:a="http://schemas.openxmlformats.org/drawingml/2006/main" xmlns:r="http://schemas.openxmlformats.org/officeDocument/2006/relationships" xmlns:p="http://schemas.openxmlformats.org/presentationml/2006/main">
   <p:cSld>
     <p:spTree>
@@ -16294,15 +15805,7 @@
           <a:p>
             <a:r>
               <a:rPr lang="en-US" dirty="0" smtClean="0"/>
-              <a:t>Demo will consist of </a:t>
-            </a:r>
-            <a:r>
-              <a:rPr lang="en-US" dirty="0" smtClean="0"/>
-              <a:t>2 </a:t>
-            </a:r>
-            <a:r>
-              <a:rPr lang="en-US" dirty="0" smtClean="0"/>
-              <a:t>separate exercises.</a:t>
+              <a:t>Demo will consist of 2 separate exercises.</a:t>
             </a:r>
           </a:p>
           <a:p>
@@ -16314,17 +15817,12 @@
               <a:rPr lang="en-US" dirty="0" smtClean="0"/>
               <a:t>RhoConnect locally</a:t>
             </a:r>
-            <a:endParaRPr lang="en-US" dirty="0" smtClean="0"/>
           </a:p>
           <a:p>
             <a:pPr marL="1028700" lvl="1"/>
             <a:r>
               <a:rPr lang="en-US" dirty="0" smtClean="0"/>
-              <a:t>Simple RhoConnect server application running on local </a:t>
-            </a:r>
-            <a:r>
-              <a:rPr lang="en-US" dirty="0" smtClean="0"/>
-              <a:t>machine.</a:t>
+              <a:t>Simple RhoConnect server application running on local machine.</a:t>
             </a:r>
           </a:p>
           <a:p>

</xml_diff>

<commit_message>
Fix messed up PPT deck
</commit_message>
<xml_diff>
--- a/Rhoconnect-appforum.pptx
+++ b/Rhoconnect-appforum.pptx
@@ -215,7 +215,7 @@
             <a:fld id="{03226B35-E884-5E4D-87DA-A7EDD87DC00C}" type="datetimeFigureOut">
               <a:rPr lang="en-US" smtClean="0"/>
               <a:pPr/>
-              <a:t>9/3/14</a:t>
+              <a:t>09/4/14</a:t>
             </a:fld>
             <a:endParaRPr lang="en-US"/>
           </a:p>
@@ -382,7 +382,7 @@
             <a:fld id="{6D788B50-DD5C-5F41-9B32-973BBF99E849}" type="datetimeFigureOut">
               <a:rPr lang="en-US" smtClean="0"/>
               <a:pPr/>
-              <a:t>9/3/14</a:t>
+              <a:t>09/4/14</a:t>
             </a:fld>
             <a:endParaRPr lang="en-US"/>
           </a:p>
@@ -994,8 +994,13 @@
             </a:r>
             <a:r>
               <a:rPr lang="en-US" baseline="0" dirty="0" smtClean="0"/>
-              <a:t> account. One caveat to building in the cloud is, you must signup for either a silver or gold level subscription. The free tier of subscription does not support remote builds.</a:t>
-            </a:r>
+              <a:t> account</a:t>
+            </a:r>
+            <a:r>
+              <a:rPr lang="en-US" baseline="0" dirty="0" smtClean="0"/>
+              <a:t>.</a:t>
+            </a:r>
+            <a:endParaRPr lang="en-US" baseline="0" dirty="0" smtClean="0"/>
           </a:p>
           <a:p>
             <a:endParaRPr lang="en-US" baseline="0" dirty="0" smtClean="0"/>
@@ -1137,7 +1142,15 @@
             </a:r>
             <a:r>
               <a:rPr lang="en-US" baseline="0" dirty="0" smtClean="0"/>
-              <a:t> account, link your local directory to the remote </a:t>
+              <a:t> </a:t>
+            </a:r>
+            <a:r>
+              <a:rPr lang="en-US" baseline="0" dirty="0" smtClean="0"/>
+              <a:t>account. One caveat to building in the cloud is, you must signup for either a silver or gold level subscription. The free tier of subscription does not support remote builds. Once you have signed up or logged in, link </a:t>
+            </a:r>
+            <a:r>
+              <a:rPr lang="en-US" baseline="0" dirty="0" smtClean="0"/>
+              <a:t>your local directory to the remote </a:t>
             </a:r>
             <a:r>
               <a:rPr lang="en-US" baseline="0" dirty="0" err="1" smtClean="0"/>
@@ -1328,11 +1341,11 @@
           <a:p>
             <a:r>
               <a:rPr lang="en-US" dirty="0" smtClean="0"/>
-              <a:t>As far as our client app is concerned, nothing needs to be changed</a:t>
+              <a:t>I’d like to briefly</a:t>
             </a:r>
             <a:r>
               <a:rPr lang="en-US" baseline="0" dirty="0" smtClean="0"/>
-              <a:t> in order for it to work with RhoConnect w/ plugins.</a:t>
+              <a:t> mention one last piece of our RhoConnect software suite, RhoConnect plugins. Plugins allow much quicker setup concerning synchronization to your back end data. With support for Java, .NET and Rails, it’s almost plug and play.</a:t>
             </a:r>
             <a:endParaRPr lang="en-US" dirty="0"/>
           </a:p>
@@ -1611,7 +1624,39 @@
             </a:r>
             <a:r>
               <a:rPr lang="en-US" baseline="0" dirty="0" smtClean="0"/>
-              <a:t> Enterprise mobile app but, you have a few problems, most of which stem from synchronization. As any of us who have manually rolled out a synchronization engine out know, it can be the most time consuming and aggravating part of your development cycle. What you need is some middle-ware that has already done all the hard work for you; for this we have created RhoConnect.</a:t>
+              <a:t> Enterprise mobile app but, you have a few problems, most of which stem from synchronization. As any </a:t>
+            </a:r>
+            <a:r>
+              <a:rPr lang="en-US" baseline="0" dirty="0" smtClean="0"/>
+              <a:t>one </a:t>
+            </a:r>
+            <a:r>
+              <a:rPr lang="en-US" baseline="0" dirty="0" smtClean="0"/>
+              <a:t>who </a:t>
+            </a:r>
+            <a:r>
+              <a:rPr lang="en-US" baseline="0" dirty="0" smtClean="0"/>
+              <a:t>has </a:t>
+            </a:r>
+            <a:r>
+              <a:rPr lang="en-US" baseline="0" dirty="0" smtClean="0"/>
+              <a:t>manually rolled out a synchronization engine </a:t>
+            </a:r>
+            <a:r>
+              <a:rPr lang="en-US" baseline="0" dirty="0" smtClean="0"/>
+              <a:t>out might </a:t>
+            </a:r>
+            <a:r>
+              <a:rPr lang="en-US" baseline="0" dirty="0" smtClean="0"/>
+              <a:t>know, it can be the most time consuming and aggravating part of your development cycle. What you need is some middle-ware that has already done all the hard work for you; for this we </a:t>
+            </a:r>
+            <a:r>
+              <a:rPr lang="en-US" baseline="0" dirty="0" smtClean="0"/>
+              <a:t>have RhoConnect</a:t>
+            </a:r>
+            <a:r>
+              <a:rPr lang="en-US" baseline="0" dirty="0" smtClean="0"/>
+              <a:t>.</a:t>
             </a:r>
             <a:endParaRPr lang="en-US" dirty="0"/>
           </a:p>
@@ -1695,7 +1740,75 @@
           <a:p>
             <a:r>
               <a:rPr lang="en-US" baseline="0" dirty="0" smtClean="0"/>
-              <a:t>RhoConnect solves the problems of scalability, performance constraints on low-resource devices, as well as other inherent enterprise solutions issues. With RhoConnect, all your business logic is separated from your app logic in such a way that RC can be used with virtually any front-end, not solely RhoMobile apps. That combined with the modern development tools and paradigms makes the entire process of setting up and maintaining your synchronization service much more enjoyable. RhoConnect also offers plugins to other programming languages so you can code in the language that best allows RhoConnect to handle sync with your environment. How RhoConnect does all this is quite complicated but maybe a visual representation of the architecture will help.</a:t>
+              <a:t>RhoConnect solves the problems of scalability, performance constraints on low-resource devices, as well as other inherent enterprise solutions </a:t>
+            </a:r>
+            <a:r>
+              <a:rPr lang="en-US" baseline="0" dirty="0" smtClean="0"/>
+              <a:t>issues.</a:t>
+            </a:r>
+          </a:p>
+          <a:p>
+            <a:endParaRPr lang="en-US" baseline="0" dirty="0" smtClean="0"/>
+          </a:p>
+          <a:p>
+            <a:r>
+              <a:rPr lang="en-US" baseline="0" dirty="0" smtClean="0"/>
+              <a:t>With </a:t>
+            </a:r>
+            <a:r>
+              <a:rPr lang="en-US" baseline="0" dirty="0" smtClean="0"/>
+              <a:t>RhoConnect, all your business logic is separated from your app logic in such a way that RC can be used with virtually any front-end, not solely RhoMobile </a:t>
+            </a:r>
+            <a:r>
+              <a:rPr lang="en-US" baseline="0" dirty="0" smtClean="0"/>
+              <a:t>apps.</a:t>
+            </a:r>
+          </a:p>
+          <a:p>
+            <a:endParaRPr lang="en-US" baseline="0" dirty="0" smtClean="0"/>
+          </a:p>
+          <a:p>
+            <a:r>
+              <a:rPr lang="en-US" baseline="0" dirty="0" smtClean="0"/>
+              <a:t>That </a:t>
+            </a:r>
+            <a:r>
+              <a:rPr lang="en-US" baseline="0" dirty="0" smtClean="0"/>
+              <a:t>combined with the modern development tools and paradigms makes the entire process of setting up and maintaining your synchronization service much more </a:t>
+            </a:r>
+            <a:r>
+              <a:rPr lang="en-US" baseline="0" dirty="0" smtClean="0"/>
+              <a:t>enjoyable.</a:t>
+            </a:r>
+          </a:p>
+          <a:p>
+            <a:endParaRPr lang="en-US" baseline="0" dirty="0" smtClean="0"/>
+          </a:p>
+          <a:p>
+            <a:r>
+              <a:rPr lang="en-US" baseline="0" dirty="0" smtClean="0"/>
+              <a:t>RhoConnect </a:t>
+            </a:r>
+            <a:r>
+              <a:rPr lang="en-US" baseline="0" dirty="0" smtClean="0"/>
+              <a:t>also offers plugins to other programming languages so you can code in the language </a:t>
+            </a:r>
+            <a:r>
+              <a:rPr lang="en-US" baseline="0" dirty="0" smtClean="0"/>
+              <a:t>that you are most comfortable and experienced with.</a:t>
+            </a:r>
+          </a:p>
+          <a:p>
+            <a:endParaRPr lang="en-US" baseline="0" dirty="0" smtClean="0"/>
+          </a:p>
+          <a:p>
+            <a:r>
+              <a:rPr lang="en-US" baseline="0" dirty="0" smtClean="0"/>
+              <a:t>How </a:t>
+            </a:r>
+            <a:r>
+              <a:rPr lang="en-US" baseline="0" dirty="0" smtClean="0"/>
+              <a:t>RhoConnect does all this is quite complicated but maybe a visual representation of the architecture will help.</a:t>
             </a:r>
             <a:endParaRPr lang="en-US" dirty="0"/>
           </a:p>
@@ -1788,7 +1901,24 @@
             </a:r>
             <a:r>
               <a:rPr lang="en-US" baseline="0" dirty="0" smtClean="0"/>
-              <a:t> interacts with your front- and back-end. As shown here in the graphic, </a:t>
+              <a:t> interacts with your front- and back-</a:t>
+            </a:r>
+            <a:r>
+              <a:rPr lang="en-US" baseline="0" dirty="0" smtClean="0"/>
+              <a:t>end.</a:t>
+            </a:r>
+          </a:p>
+          <a:p>
+            <a:endParaRPr lang="en-US" baseline="0" dirty="0" smtClean="0"/>
+          </a:p>
+          <a:p>
+            <a:r>
+              <a:rPr lang="en-US" baseline="0" dirty="0" smtClean="0"/>
+              <a:t>As </a:t>
+            </a:r>
+            <a:r>
+              <a:rPr lang="en-US" baseline="0" dirty="0" smtClean="0"/>
+              <a:t>shown here in the graphic, </a:t>
             </a:r>
             <a:r>
               <a:rPr lang="en-US" baseline="0" dirty="0" err="1" smtClean="0"/>
@@ -1796,48 +1926,88 @@
             </a:r>
             <a:r>
               <a:rPr lang="en-US" baseline="0" dirty="0" smtClean="0"/>
-              <a:t> core engine performs all the complex sync, request brokering, and other messy processes and all the RC developer needs to worry about is the part or RC that handles the CRUD operations concerning the back-end. Our documentation describes this in more detail but all the RC </a:t>
+              <a:t> </a:t>
+            </a:r>
+            <a:r>
+              <a:rPr lang="en-US" baseline="0" dirty="0" smtClean="0"/>
+              <a:t>core engine performs all the complex sync, request brokering, and other messy processes and all the RC developer needs to worry about is the part or RC that handles the CRUD operations concerning the back-</a:t>
+            </a:r>
+            <a:r>
+              <a:rPr lang="en-US" baseline="0" dirty="0" smtClean="0"/>
+              <a:t>end.</a:t>
+            </a:r>
+          </a:p>
+          <a:p>
+            <a:endParaRPr lang="en-US" baseline="0" dirty="0" smtClean="0"/>
+          </a:p>
+          <a:p>
+            <a:r>
+              <a:rPr lang="en-US" baseline="0" dirty="0" smtClean="0"/>
+              <a:t>For more information on this, please consult our docs pages at </a:t>
             </a:r>
             <a:r>
               <a:rPr lang="en-US" baseline="0" dirty="0" err="1" smtClean="0"/>
-              <a:t>dev</a:t>
-            </a:r>
+              <a:t>docs.rhomobile.com</a:t>
+            </a:r>
+            <a:endParaRPr lang="en-US" baseline="0" dirty="0" smtClean="0"/>
+          </a:p>
+          <a:p>
             <a:r>
               <a:rPr lang="en-US" baseline="0" dirty="0" smtClean="0"/>
-              <a:t> would need to do is provide the RC app with the means by which to communicate with and perform CRUD operations with the back-end, which includes having models and controllers for each object that will have sync enabled.</a:t>
+              <a:t/>
             </a:r>
             <a:br>
               <a:rPr lang="en-US" baseline="0" dirty="0" smtClean="0"/>
             </a:br>
             <a:r>
               <a:rPr lang="en-US" baseline="0" dirty="0" smtClean="0"/>
-              <a:t/>
+              <a:t>Details of the sync process:</a:t>
             </a:r>
             <a:br>
               <a:rPr lang="en-US" baseline="0" dirty="0" smtClean="0"/>
             </a:br>
             <a:r>
               <a:rPr lang="en-US" baseline="0" dirty="0" smtClean="0"/>
-              <a:t>Details of the sync process:</a:t>
-            </a:r>
-            <a:br>
+              <a:t>1) Object created on device or back-end, sync is triggered</a:t>
+            </a:r>
+            <a:r>
               <a:rPr lang="en-US" baseline="0" dirty="0" smtClean="0"/>
-            </a:br>
+              <a:t>.</a:t>
+            </a:r>
+          </a:p>
+          <a:p>
             <a:r>
               <a:rPr lang="en-US" baseline="0" dirty="0" smtClean="0"/>
-              <a:t>1) Object created on device or back-end, sync is triggered.</a:t>
-            </a:r>
-          </a:p>
-          <a:p>
+              <a:t>2) Local changes are held on the devices DB, remote changes on the RC </a:t>
+            </a:r>
+            <a:r>
+              <a:rPr lang="en-US" baseline="0" dirty="0" err="1" smtClean="0"/>
+              <a:t>redis</a:t>
+            </a:r>
             <a:r>
               <a:rPr lang="en-US" baseline="0" dirty="0" smtClean="0"/>
-              <a:t>2) RC app receives sync request and processes the request using developer provided business logic.</a:t>
-            </a:r>
+              <a:t> instance.</a:t>
+            </a:r>
+            <a:endParaRPr lang="en-US" baseline="0" dirty="0" smtClean="0"/>
           </a:p>
           <a:p>
             <a:r>
               <a:rPr lang="en-US" baseline="0" dirty="0" smtClean="0"/>
-              <a:t>3) RC app checks the data in the RC app’s associated </a:t>
+              <a:t>3) </a:t>
+            </a:r>
+            <a:r>
+              <a:rPr lang="en-US" baseline="0" dirty="0" smtClean="0"/>
+              <a:t>RC app receives sync request and processes the request using developer provided business logic.</a:t>
+            </a:r>
+          </a:p>
+          <a:p>
+            <a:r>
+              <a:rPr lang="en-US" baseline="0" dirty="0" smtClean="0"/>
+              <a:t>4) </a:t>
+            </a:r>
+            <a:r>
+              <a:rPr lang="en-US" baseline="0" dirty="0" smtClean="0"/>
+              <a:t>RC app checks the data in the RC app’s associated </a:t>
             </a:r>
             <a:r>
               <a:rPr lang="en-US" baseline="0" dirty="0" err="1" smtClean="0"/>
@@ -1851,19 +2021,31 @@
           <a:p>
             <a:r>
               <a:rPr lang="en-US" baseline="0" dirty="0" smtClean="0"/>
-              <a:t>4) Once RC has determined what is to be synced, the data is downloaded / uploaded to each location.</a:t>
-            </a:r>
-          </a:p>
-          <a:p>
+              <a:t>5) </a:t>
+            </a:r>
             <a:r>
               <a:rPr lang="en-US" baseline="0" dirty="0" smtClean="0"/>
-              <a:t>5) After the sync, RC issues statuses on the sync to the device and the back-end to notify of any errors or successes.</a:t>
+              <a:t>Once RC has determined what is to be synced, the data is downloaded / uploaded to each location.</a:t>
             </a:r>
           </a:p>
           <a:p>
             <a:r>
               <a:rPr lang="en-US" baseline="0" dirty="0" smtClean="0"/>
-              <a:t>6) Sync concludes when objects on the device match the appropriate objects on the back-end.</a:t>
+              <a:t>6) </a:t>
+            </a:r>
+            <a:r>
+              <a:rPr lang="en-US" baseline="0" dirty="0" smtClean="0"/>
+              <a:t>After the sync, RC issues statuses on the sync to the device and the back-end to notify of any errors or successes.</a:t>
+            </a:r>
+          </a:p>
+          <a:p>
+            <a:r>
+              <a:rPr lang="en-US" baseline="0" dirty="0" smtClean="0"/>
+              <a:t>7) </a:t>
+            </a:r>
+            <a:r>
+              <a:rPr lang="en-US" baseline="0" dirty="0" smtClean="0"/>
+              <a:t>Sync concludes when objects on the device match the appropriate objects on the back-end.</a:t>
             </a:r>
             <a:endParaRPr lang="en-US" dirty="0"/>
           </a:p>
@@ -14186,7 +14368,6 @@
               <a:rPr lang="en-US" dirty="0" smtClean="0"/>
               <a:t>Quickly add syncing engine to your applications</a:t>
             </a:r>
-            <a:endParaRPr lang="en-US" dirty="0" smtClean="0"/>
           </a:p>
           <a:p>
             <a:pPr marL="285750" indent="-285750">

</xml_diff>